<commit_message>
all function without check if the event exist function and common events function
</commit_message>
<xml_diff>
--- a/improved prototype final.pptx
+++ b/improved prototype final.pptx
@@ -297,7 +297,7 @@
           <a:p>
             <a:fld id="{2F696DD7-520A-476F-8728-3D5F2206F502}" type="datetimeFigureOut">
               <a:rPr lang="he-IL" smtClean="0"/>
-              <a:t>ט"ז/כסלו/תשע"ט</a:t>
+              <a:t>כ'/כסלו/תשע"ט</a:t>
             </a:fld>
             <a:endParaRPr lang="he-IL"/>
           </a:p>
@@ -495,7 +495,7 @@
           <a:p>
             <a:fld id="{2F696DD7-520A-476F-8728-3D5F2206F502}" type="datetimeFigureOut">
               <a:rPr lang="he-IL" smtClean="0"/>
-              <a:t>ט"ז/כסלו/תשע"ט</a:t>
+              <a:t>כ'/כסלו/תשע"ט</a:t>
             </a:fld>
             <a:endParaRPr lang="he-IL"/>
           </a:p>
@@ -703,7 +703,7 @@
           <a:p>
             <a:fld id="{2F696DD7-520A-476F-8728-3D5F2206F502}" type="datetimeFigureOut">
               <a:rPr lang="he-IL" smtClean="0"/>
-              <a:t>ט"ז/כסלו/תשע"ט</a:t>
+              <a:t>כ'/כסלו/תשע"ט</a:t>
             </a:fld>
             <a:endParaRPr lang="he-IL"/>
           </a:p>
@@ -901,7 +901,7 @@
           <a:p>
             <a:fld id="{2F696DD7-520A-476F-8728-3D5F2206F502}" type="datetimeFigureOut">
               <a:rPr lang="he-IL" smtClean="0"/>
-              <a:t>ט"ז/כסלו/תשע"ט</a:t>
+              <a:t>כ'/כסלו/תשע"ט</a:t>
             </a:fld>
             <a:endParaRPr lang="he-IL"/>
           </a:p>
@@ -1176,7 +1176,7 @@
           <a:p>
             <a:fld id="{2F696DD7-520A-476F-8728-3D5F2206F502}" type="datetimeFigureOut">
               <a:rPr lang="he-IL" smtClean="0"/>
-              <a:t>ט"ז/כסלו/תשע"ט</a:t>
+              <a:t>כ'/כסלו/תשע"ט</a:t>
             </a:fld>
             <a:endParaRPr lang="he-IL"/>
           </a:p>
@@ -1441,7 +1441,7 @@
           <a:p>
             <a:fld id="{2F696DD7-520A-476F-8728-3D5F2206F502}" type="datetimeFigureOut">
               <a:rPr lang="he-IL" smtClean="0"/>
-              <a:t>ט"ז/כסלו/תשע"ט</a:t>
+              <a:t>כ'/כסלו/תשע"ט</a:t>
             </a:fld>
             <a:endParaRPr lang="he-IL"/>
           </a:p>
@@ -1853,7 +1853,7 @@
           <a:p>
             <a:fld id="{2F696DD7-520A-476F-8728-3D5F2206F502}" type="datetimeFigureOut">
               <a:rPr lang="he-IL" smtClean="0"/>
-              <a:t>ט"ז/כסלו/תשע"ט</a:t>
+              <a:t>כ'/כסלו/תשע"ט</a:t>
             </a:fld>
             <a:endParaRPr lang="he-IL"/>
           </a:p>
@@ -1994,7 +1994,7 @@
           <a:p>
             <a:fld id="{2F696DD7-520A-476F-8728-3D5F2206F502}" type="datetimeFigureOut">
               <a:rPr lang="he-IL" smtClean="0"/>
-              <a:t>ט"ז/כסלו/תשע"ט</a:t>
+              <a:t>כ'/כסלו/תשע"ט</a:t>
             </a:fld>
             <a:endParaRPr lang="he-IL"/>
           </a:p>
@@ -2107,7 +2107,7 @@
           <a:p>
             <a:fld id="{2F696DD7-520A-476F-8728-3D5F2206F502}" type="datetimeFigureOut">
               <a:rPr lang="he-IL" smtClean="0"/>
-              <a:t>ט"ז/כסלו/תשע"ט</a:t>
+              <a:t>כ'/כסלו/תשע"ט</a:t>
             </a:fld>
             <a:endParaRPr lang="he-IL"/>
           </a:p>
@@ -2418,7 +2418,7 @@
           <a:p>
             <a:fld id="{2F696DD7-520A-476F-8728-3D5F2206F502}" type="datetimeFigureOut">
               <a:rPr lang="he-IL" smtClean="0"/>
-              <a:t>ט"ז/כסלו/תשע"ט</a:t>
+              <a:t>כ'/כסלו/תשע"ט</a:t>
             </a:fld>
             <a:endParaRPr lang="he-IL"/>
           </a:p>
@@ -2706,7 +2706,7 @@
           <a:p>
             <a:fld id="{2F696DD7-520A-476F-8728-3D5F2206F502}" type="datetimeFigureOut">
               <a:rPr lang="he-IL" smtClean="0"/>
-              <a:t>ט"ז/כסלו/תשע"ט</a:t>
+              <a:t>כ'/כסלו/תשע"ט</a:t>
             </a:fld>
             <a:endParaRPr lang="he-IL"/>
           </a:p>
@@ -2947,7 +2947,7 @@
           <a:p>
             <a:fld id="{2F696DD7-520A-476F-8728-3D5F2206F502}" type="datetimeFigureOut">
               <a:rPr lang="he-IL" smtClean="0"/>
-              <a:t>ט"ז/כסלו/תשע"ט</a:t>
+              <a:t>כ'/כסלו/תשע"ט</a:t>
             </a:fld>
             <a:endParaRPr lang="he-IL"/>
           </a:p>
@@ -4091,7 +4091,7 @@
                   <a:srgbClr val="92D050"/>
                 </a:solidFill>
               </a:rPr>
-              <a:t>Analytics</a:t>
+              <a:t>Reports</a:t>
             </a:r>
             <a:endParaRPr lang="he-IL" sz="2400" dirty="0">
               <a:solidFill>
@@ -14072,8 +14072,8 @@
         </p:nvSpPr>
         <p:spPr>
           <a:xfrm>
-            <a:off x="579808" y="5553199"/>
-            <a:ext cx="1299096" cy="1189361"/>
+            <a:off x="579808" y="5542343"/>
+            <a:ext cx="1299096" cy="1200217"/>
           </a:xfrm>
           <a:prstGeom prst="ellipse">
             <a:avLst/>
@@ -14112,15 +14112,14 @@
           <a:p>
             <a:pPr algn="ctr"/>
             <a:r>
-              <a:rPr lang="en-US" sz="2000" dirty="0">
+              <a:rPr lang="en-GB" sz="1400" b="1" dirty="0">
                 <a:solidFill>
                   <a:schemeClr val="bg1"/>
                 </a:solidFill>
-                <a:latin typeface="Arial Narrow" panose="020B0606020202030204" pitchFamily="34" charset="0"/>
               </a:rPr>
-              <a:t>Reports</a:t>
-            </a:r>
-            <a:endParaRPr lang="he-IL" sz="2000" dirty="0">
+              <a:t>Analytics</a:t>
+            </a:r>
+            <a:endParaRPr lang="he-IL" sz="1400" dirty="0">
               <a:solidFill>
                 <a:schemeClr val="bg1"/>
               </a:solidFill>

</xml_diff>

<commit_message>
change and add new use case
</commit_message>
<xml_diff>
--- a/improved prototype final.pptx
+++ b/improved prototype final.pptx
@@ -24,14 +24,13 @@
     <p:sldId id="275" r:id="rId18"/>
     <p:sldId id="276" r:id="rId19"/>
     <p:sldId id="281" r:id="rId20"/>
-    <p:sldId id="282" r:id="rId21"/>
-    <p:sldId id="283" r:id="rId22"/>
-    <p:sldId id="284" r:id="rId23"/>
-    <p:sldId id="277" r:id="rId24"/>
-    <p:sldId id="278" r:id="rId25"/>
-    <p:sldId id="261" r:id="rId26"/>
-    <p:sldId id="263" r:id="rId27"/>
-    <p:sldId id="268" r:id="rId28"/>
+    <p:sldId id="283" r:id="rId21"/>
+    <p:sldId id="284" r:id="rId22"/>
+    <p:sldId id="277" r:id="rId23"/>
+    <p:sldId id="278" r:id="rId24"/>
+    <p:sldId id="261" r:id="rId25"/>
+    <p:sldId id="263" r:id="rId26"/>
+    <p:sldId id="268" r:id="rId27"/>
   </p:sldIdLst>
   <p:sldSz cx="12192000" cy="6858000"/>
   <p:notesSz cx="6858000" cy="9144000"/>
@@ -297,7 +296,7 @@
           <a:p>
             <a:fld id="{2F696DD7-520A-476F-8728-3D5F2206F502}" type="datetimeFigureOut">
               <a:rPr lang="he-IL" smtClean="0"/>
-              <a:t>כ'/כסלו/תשע"ט</a:t>
+              <a:t>ל'/כסלו/תשע"ט</a:t>
             </a:fld>
             <a:endParaRPr lang="he-IL"/>
           </a:p>
@@ -495,7 +494,7 @@
           <a:p>
             <a:fld id="{2F696DD7-520A-476F-8728-3D5F2206F502}" type="datetimeFigureOut">
               <a:rPr lang="he-IL" smtClean="0"/>
-              <a:t>כ'/כסלו/תשע"ט</a:t>
+              <a:t>ל'/כסלו/תשע"ט</a:t>
             </a:fld>
             <a:endParaRPr lang="he-IL"/>
           </a:p>
@@ -703,7 +702,7 @@
           <a:p>
             <a:fld id="{2F696DD7-520A-476F-8728-3D5F2206F502}" type="datetimeFigureOut">
               <a:rPr lang="he-IL" smtClean="0"/>
-              <a:t>כ'/כסלו/תשע"ט</a:t>
+              <a:t>ל'/כסלו/תשע"ט</a:t>
             </a:fld>
             <a:endParaRPr lang="he-IL"/>
           </a:p>
@@ -901,7 +900,7 @@
           <a:p>
             <a:fld id="{2F696DD7-520A-476F-8728-3D5F2206F502}" type="datetimeFigureOut">
               <a:rPr lang="he-IL" smtClean="0"/>
-              <a:t>כ'/כסלו/תשע"ט</a:t>
+              <a:t>ל'/כסלו/תשע"ט</a:t>
             </a:fld>
             <a:endParaRPr lang="he-IL"/>
           </a:p>
@@ -1176,7 +1175,7 @@
           <a:p>
             <a:fld id="{2F696DD7-520A-476F-8728-3D5F2206F502}" type="datetimeFigureOut">
               <a:rPr lang="he-IL" smtClean="0"/>
-              <a:t>כ'/כסלו/תשע"ט</a:t>
+              <a:t>ל'/כסלו/תשע"ט</a:t>
             </a:fld>
             <a:endParaRPr lang="he-IL"/>
           </a:p>
@@ -1441,7 +1440,7 @@
           <a:p>
             <a:fld id="{2F696DD7-520A-476F-8728-3D5F2206F502}" type="datetimeFigureOut">
               <a:rPr lang="he-IL" smtClean="0"/>
-              <a:t>כ'/כסלו/תשע"ט</a:t>
+              <a:t>ל'/כסלו/תשע"ט</a:t>
             </a:fld>
             <a:endParaRPr lang="he-IL"/>
           </a:p>
@@ -1853,7 +1852,7 @@
           <a:p>
             <a:fld id="{2F696DD7-520A-476F-8728-3D5F2206F502}" type="datetimeFigureOut">
               <a:rPr lang="he-IL" smtClean="0"/>
-              <a:t>כ'/כסלו/תשע"ט</a:t>
+              <a:t>ל'/כסלו/תשע"ט</a:t>
             </a:fld>
             <a:endParaRPr lang="he-IL"/>
           </a:p>
@@ -1994,7 +1993,7 @@
           <a:p>
             <a:fld id="{2F696DD7-520A-476F-8728-3D5F2206F502}" type="datetimeFigureOut">
               <a:rPr lang="he-IL" smtClean="0"/>
-              <a:t>כ'/כסלו/תשע"ט</a:t>
+              <a:t>ל'/כסלו/תשע"ט</a:t>
             </a:fld>
             <a:endParaRPr lang="he-IL"/>
           </a:p>
@@ -2107,7 +2106,7 @@
           <a:p>
             <a:fld id="{2F696DD7-520A-476F-8728-3D5F2206F502}" type="datetimeFigureOut">
               <a:rPr lang="he-IL" smtClean="0"/>
-              <a:t>כ'/כסלו/תשע"ט</a:t>
+              <a:t>ל'/כסלו/תשע"ט</a:t>
             </a:fld>
             <a:endParaRPr lang="he-IL"/>
           </a:p>
@@ -2418,7 +2417,7 @@
           <a:p>
             <a:fld id="{2F696DD7-520A-476F-8728-3D5F2206F502}" type="datetimeFigureOut">
               <a:rPr lang="he-IL" smtClean="0"/>
-              <a:t>כ'/כסלו/תשע"ט</a:t>
+              <a:t>ל'/כסלו/תשע"ט</a:t>
             </a:fld>
             <a:endParaRPr lang="he-IL"/>
           </a:p>
@@ -2706,7 +2705,7 @@
           <a:p>
             <a:fld id="{2F696DD7-520A-476F-8728-3D5F2206F502}" type="datetimeFigureOut">
               <a:rPr lang="he-IL" smtClean="0"/>
-              <a:t>כ'/כסלו/תשע"ט</a:t>
+              <a:t>ל'/כסלו/תשע"ט</a:t>
             </a:fld>
             <a:endParaRPr lang="he-IL"/>
           </a:p>
@@ -2947,7 +2946,7 @@
           <a:p>
             <a:fld id="{2F696DD7-520A-476F-8728-3D5F2206F502}" type="datetimeFigureOut">
               <a:rPr lang="he-IL" smtClean="0"/>
-              <a:t>כ'/כסלו/תשע"ט</a:t>
+              <a:t>ל'/כסלו/תשע"ט</a:t>
             </a:fld>
             <a:endParaRPr lang="he-IL"/>
           </a:p>
@@ -14219,11 +14218,11 @@
       </p:sp>
       <p:sp>
         <p:nvSpPr>
-          <p:cNvPr id="5" name="אליפסה 4">
+          <p:cNvPr id="6" name="אליפסה 5">
             <a:hlinkClick r:id="rId2" action="ppaction://hlinksldjump"/>
             <a:extLst>
               <a:ext uri="{FF2B5EF4-FFF2-40B4-BE49-F238E27FC236}">
-                <a16:creationId xmlns:a16="http://schemas.microsoft.com/office/drawing/2014/main" id="{A7496070-4BAD-4787-8452-970571E2A05B}"/>
+                <a16:creationId xmlns:a16="http://schemas.microsoft.com/office/drawing/2014/main" id="{F158FF11-28B2-4E76-8A15-1AE1FDBC9B7A}"/>
               </a:ext>
             </a:extLst>
           </p:cNvPr>
@@ -14232,7 +14231,7 @@
         </p:nvSpPr>
         <p:spPr>
           <a:xfrm>
-            <a:off x="1896650" y="2279737"/>
+            <a:off x="2486208" y="2199671"/>
             <a:ext cx="2525037" cy="2824010"/>
           </a:xfrm>
           <a:prstGeom prst="ellipse">
@@ -14272,7 +14271,7 @@
                   <a:srgbClr val="92D050"/>
                 </a:solidFill>
               </a:rPr>
-              <a:t>Common</a:t>
+              <a:t>Events By</a:t>
             </a:r>
           </a:p>
           <a:p>
@@ -14283,18 +14282,18 @@
                   <a:srgbClr val="92D050"/>
                 </a:solidFill>
               </a:rPr>
-              <a:t>Events</a:t>
-            </a:r>
-          </a:p>
-        </p:txBody>
-      </p:sp>
-      <p:sp>
-        <p:nvSpPr>
-          <p:cNvPr id="6" name="אליפסה 5">
+              <a:t>Supervisor</a:t>
+            </a:r>
+          </a:p>
+        </p:txBody>
+      </p:sp>
+      <p:sp>
+        <p:nvSpPr>
+          <p:cNvPr id="7" name="אליפסה 6">
             <a:hlinkClick r:id="rId3" action="ppaction://hlinksldjump"/>
             <a:extLst>
               <a:ext uri="{FF2B5EF4-FFF2-40B4-BE49-F238E27FC236}">
-                <a16:creationId xmlns:a16="http://schemas.microsoft.com/office/drawing/2014/main" id="{F158FF11-28B2-4E76-8A15-1AE1FDBC9B7A}"/>
+                <a16:creationId xmlns:a16="http://schemas.microsoft.com/office/drawing/2014/main" id="{83C16521-83B7-4824-9D38-5F34B1AFF838}"/>
               </a:ext>
             </a:extLst>
           </p:cNvPr>
@@ -14303,8 +14302,8 @@
         </p:nvSpPr>
         <p:spPr>
           <a:xfrm>
-            <a:off x="4833482" y="2279737"/>
-            <a:ext cx="2525037" cy="2824010"/>
+            <a:off x="7261267" y="2199671"/>
+            <a:ext cx="2525038" cy="2824010"/>
           </a:xfrm>
           <a:prstGeom prst="ellipse">
             <a:avLst/>
@@ -14343,77 +14342,6 @@
                   <a:srgbClr val="92D050"/>
                 </a:solidFill>
               </a:rPr>
-              <a:t>Events By</a:t>
-            </a:r>
-          </a:p>
-          <a:p>
-            <a:pPr algn="ctr"/>
-            <a:r>
-              <a:rPr lang="en-US" sz="2800" dirty="0">
-                <a:solidFill>
-                  <a:srgbClr val="92D050"/>
-                </a:solidFill>
-              </a:rPr>
-              <a:t>Supervisor</a:t>
-            </a:r>
-          </a:p>
-        </p:txBody>
-      </p:sp>
-      <p:sp>
-        <p:nvSpPr>
-          <p:cNvPr id="7" name="אליפסה 6">
-            <a:hlinkClick r:id="rId4" action="ppaction://hlinksldjump"/>
-            <a:extLst>
-              <a:ext uri="{FF2B5EF4-FFF2-40B4-BE49-F238E27FC236}">
-                <a16:creationId xmlns:a16="http://schemas.microsoft.com/office/drawing/2014/main" id="{83C16521-83B7-4824-9D38-5F34B1AFF838}"/>
-              </a:ext>
-            </a:extLst>
-          </p:cNvPr>
-          <p:cNvSpPr/>
-          <p:nvPr/>
-        </p:nvSpPr>
-        <p:spPr>
-          <a:xfrm>
-            <a:off x="7770315" y="2279737"/>
-            <a:ext cx="2525038" cy="2824010"/>
-          </a:xfrm>
-          <a:prstGeom prst="ellipse">
-            <a:avLst/>
-          </a:prstGeom>
-          <a:noFill/>
-          <a:ln w="76200">
-            <a:solidFill>
-              <a:srgbClr val="92D050"/>
-            </a:solidFill>
-          </a:ln>
-        </p:spPr>
-        <p:style>
-          <a:lnRef idx="2">
-            <a:schemeClr val="accent1">
-              <a:shade val="50000"/>
-            </a:schemeClr>
-          </a:lnRef>
-          <a:fillRef idx="1">
-            <a:schemeClr val="accent1"/>
-          </a:fillRef>
-          <a:effectRef idx="0">
-            <a:schemeClr val="accent1"/>
-          </a:effectRef>
-          <a:fontRef idx="minor">
-            <a:schemeClr val="lt1"/>
-          </a:fontRef>
-        </p:style>
-        <p:txBody>
-          <a:bodyPr rtlCol="1" anchor="ctr"/>
-          <a:lstStyle/>
-          <a:p>
-            <a:pPr algn="ctr"/>
-            <a:r>
-              <a:rPr lang="en-US" sz="2800" dirty="0">
-                <a:solidFill>
-                  <a:srgbClr val="92D050"/>
-                </a:solidFill>
-              </a:rPr>
               <a:t>Pending Events By Supervisor</a:t>
             </a:r>
           </a:p>
@@ -14422,7 +14350,7 @@
       <p:pic>
         <p:nvPicPr>
           <p:cNvPr id="8" name="תמונה 7">
-            <a:hlinkClick r:id="rId5" action="ppaction://hlinksldjump"/>
+            <a:hlinkClick r:id="rId4" action="ppaction://hlinksldjump"/>
             <a:extLst>
               <a:ext uri="{FF2B5EF4-FFF2-40B4-BE49-F238E27FC236}">
                 <a16:creationId xmlns:a16="http://schemas.microsoft.com/office/drawing/2014/main" id="{A5F74AA9-DF0C-4185-991C-8566B6CE7002}"/>
@@ -14435,7 +14363,7 @@
           <p:nvPr/>
         </p:nvPicPr>
         <p:blipFill>
-          <a:blip r:embed="rId6"/>
+          <a:blip r:embed="rId5"/>
           <a:stretch>
             <a:fillRect/>
           </a:stretch>
@@ -14453,7 +14381,7 @@
       <p:sp>
         <p:nvSpPr>
           <p:cNvPr id="9" name="אליפסה 8">
-            <a:hlinkClick r:id="rId7" action="ppaction://hlinksldjump"/>
+            <a:hlinkClick r:id="rId6" action="ppaction://hlinksldjump"/>
             <a:extLst>
               <a:ext uri="{FF2B5EF4-FFF2-40B4-BE49-F238E27FC236}">
                 <a16:creationId xmlns:a16="http://schemas.microsoft.com/office/drawing/2014/main" id="{433E26BB-985A-4CB8-A700-4B05EB3DD514}"/>
@@ -14900,7 +14828,7 @@
           <p:cNvPr id="2" name="כותרת 1">
             <a:extLst>
               <a:ext uri="{FF2B5EF4-FFF2-40B4-BE49-F238E27FC236}">
-                <a16:creationId xmlns:a16="http://schemas.microsoft.com/office/drawing/2014/main" id="{E3576076-EC21-4CA3-80E6-48E00A6F3838}"/>
+                <a16:creationId xmlns:a16="http://schemas.microsoft.com/office/drawing/2014/main" id="{7730EA33-6060-48D0-B095-74D69D091F9C}"/>
               </a:ext>
             </a:extLst>
           </p:cNvPr>
@@ -14913,8 +14841,8 @@
         </p:nvSpPr>
         <p:spPr>
           <a:xfrm>
-            <a:off x="3412820" y="500062"/>
-            <a:ext cx="5366359" cy="1325563"/>
+            <a:off x="2222848" y="500062"/>
+            <a:ext cx="7746304" cy="1325563"/>
           </a:xfrm>
         </p:spPr>
         <p:txBody>
@@ -14929,7 +14857,7 @@
                   <a:srgbClr val="92D050"/>
                 </a:solidFill>
               </a:rPr>
-              <a:t>Common Event</a:t>
+              <a:t>Events By supervisor</a:t>
             </a:r>
             <a:br>
               <a:rPr lang="en-US" dirty="0">
@@ -14942,401 +14870,607 @@
           </a:p>
         </p:txBody>
       </p:sp>
-      <p:graphicFrame>
-        <p:nvGraphicFramePr>
-          <p:cNvPr id="4" name="טבלה 3">
-            <a:extLst>
-              <a:ext uri="{FF2B5EF4-FFF2-40B4-BE49-F238E27FC236}">
-                <a16:creationId xmlns:a16="http://schemas.microsoft.com/office/drawing/2014/main" id="{B96BC705-5E96-45AA-B2E1-45D44CC01473}"/>
-              </a:ext>
-            </a:extLst>
-          </p:cNvPr>
-          <p:cNvGraphicFramePr>
-            <a:graphicFrameLocks noGrp="1"/>
-          </p:cNvGraphicFramePr>
-          <p:nvPr>
-            <p:extLst>
-              <p:ext uri="{D42A27DB-BD31-4B8C-83A1-F6EECF244321}">
-                <p14:modId xmlns:p14="http://schemas.microsoft.com/office/powerpoint/2010/main" val="2290615773"/>
-              </p:ext>
-            </p:extLst>
-          </p:nvPr>
-        </p:nvGraphicFramePr>
-        <p:xfrm>
-          <a:off x="1536527" y="1453020"/>
-          <a:ext cx="9118946" cy="4296427"/>
-        </p:xfrm>
-        <a:graphic>
-          <a:graphicData uri="http://schemas.openxmlformats.org/drawingml/2006/table">
-            <a:tbl>
-              <a:tblPr rtl="1" firstRow="1" bandRow="1">
-                <a:tableStyleId>{93296810-A885-4BE3-A3E7-6D5BEEA58F35}</a:tableStyleId>
-              </a:tblPr>
-              <a:tblGrid>
-                <a:gridCol w="2619747">
-                  <a:extLst>
-                    <a:ext uri="{9D8B030D-6E8A-4147-A177-3AD203B41FA5}">
-                      <a16:colId xmlns:a16="http://schemas.microsoft.com/office/drawing/2014/main" val="1473483608"/>
-                    </a:ext>
-                  </a:extLst>
-                </a:gridCol>
-                <a:gridCol w="2274163">
-                  <a:extLst>
-                    <a:ext uri="{9D8B030D-6E8A-4147-A177-3AD203B41FA5}">
-                      <a16:colId xmlns:a16="http://schemas.microsoft.com/office/drawing/2014/main" val="1847903682"/>
-                    </a:ext>
-                  </a:extLst>
-                </a:gridCol>
-                <a:gridCol w="2597452">
-                  <a:extLst>
-                    <a:ext uri="{9D8B030D-6E8A-4147-A177-3AD203B41FA5}">
-                      <a16:colId xmlns:a16="http://schemas.microsoft.com/office/drawing/2014/main" val="2137394321"/>
-                    </a:ext>
-                  </a:extLst>
-                </a:gridCol>
-                <a:gridCol w="1627584">
-                  <a:extLst>
-                    <a:ext uri="{9D8B030D-6E8A-4147-A177-3AD203B41FA5}">
-                      <a16:colId xmlns:a16="http://schemas.microsoft.com/office/drawing/2014/main" val="2033288465"/>
-                    </a:ext>
-                  </a:extLst>
-                </a:gridCol>
-              </a:tblGrid>
-              <a:tr h="741849">
-                <a:tc>
-                  <a:txBody>
-                    <a:bodyPr/>
-                    <a:lstStyle/>
-                    <a:p>
-                      <a:pPr algn="l" rtl="1"/>
-                      <a:r>
-                        <a:rPr lang="en-US" dirty="0"/>
-                        <a:t>Amount Of Events Until Today</a:t>
-                      </a:r>
-                      <a:endParaRPr lang="he-IL" dirty="0"/>
-                    </a:p>
-                  </a:txBody>
-                  <a:tcPr/>
-                </a:tc>
-                <a:tc>
-                  <a:txBody>
-                    <a:bodyPr/>
-                    <a:lstStyle/>
-                    <a:p>
-                      <a:pPr algn="l" rtl="1"/>
-                      <a:r>
-                        <a:rPr lang="en-US" dirty="0"/>
-                        <a:t>Supervisor </a:t>
-                      </a:r>
-                      <a:endParaRPr lang="he-IL" dirty="0"/>
-                    </a:p>
-                  </a:txBody>
-                  <a:tcPr/>
-                </a:tc>
-                <a:tc>
-                  <a:txBody>
-                    <a:bodyPr/>
-                    <a:lstStyle/>
-                    <a:p>
-                      <a:pPr algn="l" rtl="1"/>
-                      <a:r>
-                        <a:rPr lang="en-US" dirty="0"/>
-                        <a:t>Event Description</a:t>
-                      </a:r>
-                      <a:endParaRPr lang="he-IL" dirty="0"/>
-                    </a:p>
-                  </a:txBody>
-                  <a:tcPr/>
-                </a:tc>
-                <a:tc>
-                  <a:txBody>
-                    <a:bodyPr/>
-                    <a:lstStyle/>
-                    <a:p>
-                      <a:pPr algn="l" rtl="1"/>
-                      <a:r>
-                        <a:rPr lang="en-US" dirty="0"/>
-                        <a:t>Subject</a:t>
-                      </a:r>
-                      <a:endParaRPr lang="he-IL" dirty="0"/>
-                    </a:p>
-                  </a:txBody>
-                  <a:tcPr/>
-                </a:tc>
-                <a:extLst>
-                  <a:ext uri="{0D108BD9-81ED-4DB2-BD59-A6C34878D82A}">
-                    <a16:rowId xmlns:a16="http://schemas.microsoft.com/office/drawing/2014/main" val="1228919773"/>
-                  </a:ext>
-                </a:extLst>
-              </a:tr>
-              <a:tr h="1034274">
-                <a:tc>
-                  <a:txBody>
-                    <a:bodyPr/>
-                    <a:lstStyle/>
-                    <a:p>
-                      <a:pPr algn="l" rtl="1"/>
-                      <a:r>
-                        <a:rPr lang="en-US" dirty="0"/>
-                        <a:t>21</a:t>
-                      </a:r>
-                      <a:endParaRPr lang="he-IL" dirty="0"/>
-                    </a:p>
-                  </a:txBody>
-                  <a:tcPr/>
-                </a:tc>
-                <a:tc>
-                  <a:txBody>
-                    <a:bodyPr/>
-                    <a:lstStyle/>
-                    <a:p>
-                      <a:pPr marL="0" marR="0" lvl="0" indent="0" algn="l" defTabSz="914400" rtl="1" eaLnBrk="1" fontAlgn="auto" latinLnBrk="0" hangingPunct="1">
-                        <a:lnSpc>
-                          <a:spcPct val="100000"/>
-                        </a:lnSpc>
-                        <a:spcBef>
-                          <a:spcPts val="0"/>
-                        </a:spcBef>
-                        <a:spcAft>
-                          <a:spcPts val="0"/>
-                        </a:spcAft>
-                        <a:buClrTx/>
-                        <a:buSzTx/>
-                        <a:buFontTx/>
-                        <a:buNone/>
-                        <a:tabLst/>
-                        <a:defRPr/>
-                      </a:pPr>
-                      <a:r>
-                        <a:rPr lang="en-US" dirty="0"/>
-                        <a:t>Maintenance</a:t>
-                      </a:r>
-                      <a:endParaRPr lang="he-IL" dirty="0"/>
-                    </a:p>
-                    <a:p>
-                      <a:pPr algn="l" rtl="1"/>
-                      <a:endParaRPr lang="he-IL" dirty="0"/>
-                    </a:p>
-                  </a:txBody>
-                  <a:tcPr/>
-                </a:tc>
-                <a:tc>
-                  <a:txBody>
-                    <a:bodyPr/>
-                    <a:lstStyle/>
-                    <a:p>
-                      <a:pPr algn="l" rtl="1"/>
-                      <a:r>
-                        <a:rPr lang="en-US" dirty="0"/>
-                        <a:t>blinking light in class 211 AZ.</a:t>
-                      </a:r>
-                      <a:endParaRPr lang="he-IL" dirty="0"/>
-                    </a:p>
-                  </a:txBody>
-                  <a:tcPr/>
-                </a:tc>
-                <a:tc>
-                  <a:txBody>
-                    <a:bodyPr/>
-                    <a:lstStyle/>
-                    <a:p>
-                      <a:pPr marL="0" marR="0" lvl="0" indent="0" algn="l" defTabSz="914400" rtl="1" eaLnBrk="1" fontAlgn="auto" latinLnBrk="0" hangingPunct="1">
-                        <a:lnSpc>
-                          <a:spcPct val="100000"/>
-                        </a:lnSpc>
-                        <a:spcBef>
-                          <a:spcPts val="0"/>
-                        </a:spcBef>
-                        <a:spcAft>
-                          <a:spcPts val="0"/>
-                        </a:spcAft>
-                        <a:buClrTx/>
-                        <a:buSzTx/>
-                        <a:buFontTx/>
-                        <a:buNone/>
-                        <a:tabLst/>
-                        <a:defRPr/>
-                      </a:pPr>
-                      <a:r>
-                        <a:rPr lang="en-US" dirty="0"/>
-                        <a:t>Blinking light</a:t>
-                      </a:r>
-                      <a:endParaRPr lang="he-IL" dirty="0"/>
-                    </a:p>
-                    <a:p>
-                      <a:pPr algn="l" rtl="1"/>
-                      <a:endParaRPr lang="he-IL" dirty="0"/>
-                    </a:p>
-                  </a:txBody>
-                  <a:tcPr/>
-                </a:tc>
-                <a:extLst>
-                  <a:ext uri="{0D108BD9-81ED-4DB2-BD59-A6C34878D82A}">
-                    <a16:rowId xmlns:a16="http://schemas.microsoft.com/office/drawing/2014/main" val="4120531732"/>
-                  </a:ext>
-                </a:extLst>
-              </a:tr>
-              <a:tr h="1296290">
-                <a:tc>
-                  <a:txBody>
-                    <a:bodyPr/>
-                    <a:lstStyle/>
-                    <a:p>
-                      <a:pPr algn="l" rtl="1"/>
-                      <a:r>
-                        <a:rPr lang="en-US" dirty="0"/>
-                        <a:t>50</a:t>
-                      </a:r>
-                      <a:endParaRPr lang="he-IL" dirty="0"/>
-                    </a:p>
-                  </a:txBody>
-                  <a:tcPr/>
-                </a:tc>
-                <a:tc>
-                  <a:txBody>
-                    <a:bodyPr/>
-                    <a:lstStyle/>
-                    <a:p>
-                      <a:pPr algn="l" rtl="1"/>
-                      <a:r>
-                        <a:rPr lang="en-US" dirty="0"/>
-                        <a:t>Cleaning</a:t>
-                      </a:r>
-                      <a:endParaRPr lang="he-IL" dirty="0"/>
-                    </a:p>
-                  </a:txBody>
-                  <a:tcPr/>
-                </a:tc>
-                <a:tc>
-                  <a:txBody>
-                    <a:bodyPr/>
-                    <a:lstStyle/>
-                    <a:p>
-                      <a:pPr algn="l" rtl="1"/>
-                      <a:r>
-                        <a:rPr lang="en-US" dirty="0"/>
-                        <a:t>Toilet paper missing</a:t>
-                      </a:r>
-                      <a:endParaRPr lang="he-IL" dirty="0"/>
-                    </a:p>
-                  </a:txBody>
-                  <a:tcPr/>
-                </a:tc>
-                <a:tc>
-                  <a:txBody>
-                    <a:bodyPr/>
-                    <a:lstStyle/>
-                    <a:p>
-                      <a:pPr marL="0" marR="0" lvl="0" indent="0" algn="l" defTabSz="914400" rtl="1" eaLnBrk="1" fontAlgn="auto" latinLnBrk="0" hangingPunct="1">
-                        <a:lnSpc>
-                          <a:spcPct val="100000"/>
-                        </a:lnSpc>
-                        <a:spcBef>
-                          <a:spcPts val="0"/>
-                        </a:spcBef>
-                        <a:spcAft>
-                          <a:spcPts val="0"/>
-                        </a:spcAft>
-                        <a:buClrTx/>
-                        <a:buSzTx/>
-                        <a:buFontTx/>
-                        <a:buNone/>
-                        <a:tabLst/>
-                        <a:defRPr/>
-                      </a:pPr>
-                      <a:r>
-                        <a:rPr lang="en-US" dirty="0"/>
-                        <a:t>Toilet paper </a:t>
-                      </a:r>
-                      <a:endParaRPr lang="he-IL" dirty="0"/>
-                    </a:p>
-                  </a:txBody>
-                  <a:tcPr/>
-                </a:tc>
-                <a:extLst>
-                  <a:ext uri="{0D108BD9-81ED-4DB2-BD59-A6C34878D82A}">
-                    <a16:rowId xmlns:a16="http://schemas.microsoft.com/office/drawing/2014/main" val="3981230142"/>
-                  </a:ext>
-                </a:extLst>
-              </a:tr>
-              <a:tr h="1224014">
-                <a:tc>
-                  <a:txBody>
-                    <a:bodyPr/>
-                    <a:lstStyle/>
-                    <a:p>
-                      <a:pPr algn="l" rtl="1"/>
-                      <a:r>
-                        <a:rPr lang="en-US" dirty="0"/>
-                        <a:t>80</a:t>
-                      </a:r>
-                      <a:endParaRPr lang="he-IL" dirty="0"/>
-                    </a:p>
-                  </a:txBody>
-                  <a:tcPr/>
-                </a:tc>
-                <a:tc>
-                  <a:txBody>
-                    <a:bodyPr/>
-                    <a:lstStyle/>
-                    <a:p>
-                      <a:pPr algn="l" rtl="1"/>
-                      <a:r>
-                        <a:rPr lang="en-US" dirty="0"/>
-                        <a:t>Dean</a:t>
-                      </a:r>
-                      <a:endParaRPr lang="he-IL" dirty="0"/>
-                    </a:p>
-                  </a:txBody>
-                  <a:tcPr/>
-                </a:tc>
-                <a:tc>
-                  <a:txBody>
-                    <a:bodyPr/>
-                    <a:lstStyle/>
-                    <a:p>
-                      <a:pPr algn="l" rtl="1"/>
-                      <a:r>
-                        <a:rPr lang="en-US" dirty="0"/>
-                        <a:t>Need more practice hours.</a:t>
-                      </a:r>
-                      <a:endParaRPr lang="he-IL" dirty="0"/>
-                    </a:p>
-                  </a:txBody>
-                  <a:tcPr/>
-                </a:tc>
-                <a:tc>
-                  <a:txBody>
-                    <a:bodyPr/>
-                    <a:lstStyle/>
-                    <a:p>
-                      <a:pPr algn="l" rtl="1"/>
-                      <a:r>
-                        <a:rPr lang="en-US" dirty="0"/>
-                        <a:t>Studies</a:t>
-                      </a:r>
-                      <a:endParaRPr lang="he-IL" dirty="0"/>
-                    </a:p>
-                  </a:txBody>
-                  <a:tcPr/>
-                </a:tc>
-                <a:extLst>
-                  <a:ext uri="{0D108BD9-81ED-4DB2-BD59-A6C34878D82A}">
-                    <a16:rowId xmlns:a16="http://schemas.microsoft.com/office/drawing/2014/main" val="4122735466"/>
-                  </a:ext>
-                </a:extLst>
-              </a:tr>
-            </a:tbl>
-          </a:graphicData>
-        </a:graphic>
-      </p:graphicFrame>
-      <p:sp>
-        <p:nvSpPr>
-          <p:cNvPr id="5" name="אליפסה 4">
-            <a:hlinkClick r:id="rId2" action="ppaction://hlinksldjump"/>
-            <a:extLst>
-              <a:ext uri="{FF2B5EF4-FFF2-40B4-BE49-F238E27FC236}">
-                <a16:creationId xmlns:a16="http://schemas.microsoft.com/office/drawing/2014/main" id="{C093A001-0E1C-483E-90E2-C850933BE859}"/>
+      <p:cxnSp>
+        <p:nvCxnSpPr>
+          <p:cNvPr id="7" name="מחבר חץ ישר 6">
+            <a:extLst>
+              <a:ext uri="{FF2B5EF4-FFF2-40B4-BE49-F238E27FC236}">
+                <a16:creationId xmlns:a16="http://schemas.microsoft.com/office/drawing/2014/main" id="{2506DE58-E6C4-48FB-95C6-80F0C720E1E7}"/>
+              </a:ext>
+            </a:extLst>
+          </p:cNvPr>
+          <p:cNvCxnSpPr>
+            <a:cxnSpLocks/>
+          </p:cNvCxnSpPr>
+          <p:nvPr/>
+        </p:nvCxnSpPr>
+        <p:spPr>
+          <a:xfrm flipV="1">
+            <a:off x="2222848" y="1703540"/>
+            <a:ext cx="0" cy="4083486"/>
+          </a:xfrm>
+          <a:prstGeom prst="straightConnector1">
+            <a:avLst/>
+          </a:prstGeom>
+          <a:ln>
+            <a:solidFill>
+              <a:schemeClr val="accent6">
+                <a:lumMod val="50000"/>
+              </a:schemeClr>
+            </a:solidFill>
+            <a:tailEnd type="triangle"/>
+          </a:ln>
+        </p:spPr>
+        <p:style>
+          <a:lnRef idx="1">
+            <a:schemeClr val="accent1"/>
+          </a:lnRef>
+          <a:fillRef idx="0">
+            <a:schemeClr val="accent1"/>
+          </a:fillRef>
+          <a:effectRef idx="0">
+            <a:schemeClr val="accent1"/>
+          </a:effectRef>
+          <a:fontRef idx="minor">
+            <a:schemeClr val="tx1"/>
+          </a:fontRef>
+        </p:style>
+      </p:cxnSp>
+      <p:cxnSp>
+        <p:nvCxnSpPr>
+          <p:cNvPr id="9" name="מחבר חץ ישר 8">
+            <a:extLst>
+              <a:ext uri="{FF2B5EF4-FFF2-40B4-BE49-F238E27FC236}">
+                <a16:creationId xmlns:a16="http://schemas.microsoft.com/office/drawing/2014/main" id="{9571FF17-580B-42A1-93AB-F927F527EFCB}"/>
+              </a:ext>
+            </a:extLst>
+          </p:cNvPr>
+          <p:cNvCxnSpPr/>
+          <p:nvPr/>
+        </p:nvCxnSpPr>
+        <p:spPr>
+          <a:xfrm>
+            <a:off x="2222848" y="5787026"/>
+            <a:ext cx="8061020" cy="0"/>
+          </a:xfrm>
+          <a:prstGeom prst="straightConnector1">
+            <a:avLst/>
+          </a:prstGeom>
+          <a:ln>
+            <a:solidFill>
+              <a:schemeClr val="accent6">
+                <a:lumMod val="50000"/>
+              </a:schemeClr>
+            </a:solidFill>
+            <a:tailEnd type="triangle"/>
+          </a:ln>
+        </p:spPr>
+        <p:style>
+          <a:lnRef idx="1">
+            <a:schemeClr val="accent1"/>
+          </a:lnRef>
+          <a:fillRef idx="0">
+            <a:schemeClr val="accent1"/>
+          </a:fillRef>
+          <a:effectRef idx="0">
+            <a:schemeClr val="accent1"/>
+          </a:effectRef>
+          <a:fontRef idx="minor">
+            <a:schemeClr val="tx1"/>
+          </a:fontRef>
+        </p:style>
+      </p:cxnSp>
+      <p:sp>
+        <p:nvSpPr>
+          <p:cNvPr id="12" name="TextBox 11">
+            <a:extLst>
+              <a:ext uri="{FF2B5EF4-FFF2-40B4-BE49-F238E27FC236}">
+                <a16:creationId xmlns:a16="http://schemas.microsoft.com/office/drawing/2014/main" id="{A8504308-07EE-47A3-ACE8-6DBED4E8EC0D}"/>
+              </a:ext>
+            </a:extLst>
+          </p:cNvPr>
+          <p:cNvSpPr txBox="1"/>
+          <p:nvPr/>
+        </p:nvSpPr>
+        <p:spPr>
+          <a:xfrm>
+            <a:off x="1615858" y="1044683"/>
+            <a:ext cx="1240057" cy="646331"/>
+          </a:xfrm>
+          <a:prstGeom prst="rect">
+            <a:avLst/>
+          </a:prstGeom>
+          <a:noFill/>
+        </p:spPr>
+        <p:txBody>
+          <a:bodyPr wrap="square" rtlCol="1">
+            <a:spAutoFit/>
+          </a:bodyPr>
+          <a:lstStyle/>
+          <a:p>
+            <a:pPr algn="ctr"/>
+            <a:r>
+              <a:rPr lang="en-US" dirty="0"/>
+              <a:t>Amount of events</a:t>
+            </a:r>
+            <a:endParaRPr lang="he-IL" dirty="0"/>
+          </a:p>
+        </p:txBody>
+      </p:sp>
+      <p:sp>
+        <p:nvSpPr>
+          <p:cNvPr id="14" name="TextBox 13">
+            <a:extLst>
+              <a:ext uri="{FF2B5EF4-FFF2-40B4-BE49-F238E27FC236}">
+                <a16:creationId xmlns:a16="http://schemas.microsoft.com/office/drawing/2014/main" id="{82DBC2F1-C340-47EF-A1BA-494B368F6BCA}"/>
+              </a:ext>
+            </a:extLst>
+          </p:cNvPr>
+          <p:cNvSpPr txBox="1"/>
+          <p:nvPr/>
+        </p:nvSpPr>
+        <p:spPr>
+          <a:xfrm>
+            <a:off x="1419751" y="2311430"/>
+            <a:ext cx="789140" cy="369332"/>
+          </a:xfrm>
+          <a:prstGeom prst="rect">
+            <a:avLst/>
+          </a:prstGeom>
+          <a:noFill/>
+        </p:spPr>
+        <p:txBody>
+          <a:bodyPr wrap="square" rtlCol="1">
+            <a:spAutoFit/>
+          </a:bodyPr>
+          <a:lstStyle/>
+          <a:p>
+            <a:r>
+              <a:rPr lang="en-US" dirty="0"/>
+              <a:t>350</a:t>
+            </a:r>
+            <a:endParaRPr lang="he-IL" dirty="0"/>
+          </a:p>
+        </p:txBody>
+      </p:sp>
+      <p:sp>
+        <p:nvSpPr>
+          <p:cNvPr id="16" name="TextBox 15">
+            <a:extLst>
+              <a:ext uri="{FF2B5EF4-FFF2-40B4-BE49-F238E27FC236}">
+                <a16:creationId xmlns:a16="http://schemas.microsoft.com/office/drawing/2014/main" id="{BD9A2C19-DA7A-4193-AC00-D77DFA880628}"/>
+              </a:ext>
+            </a:extLst>
+          </p:cNvPr>
+          <p:cNvSpPr txBox="1"/>
+          <p:nvPr/>
+        </p:nvSpPr>
+        <p:spPr>
+          <a:xfrm>
+            <a:off x="1419751" y="3895715"/>
+            <a:ext cx="789140" cy="369332"/>
+          </a:xfrm>
+          <a:prstGeom prst="rect">
+            <a:avLst/>
+          </a:prstGeom>
+          <a:noFill/>
+        </p:spPr>
+        <p:txBody>
+          <a:bodyPr wrap="square" rtlCol="1">
+            <a:spAutoFit/>
+          </a:bodyPr>
+          <a:lstStyle/>
+          <a:p>
+            <a:r>
+              <a:rPr lang="en-US" dirty="0"/>
+              <a:t>150</a:t>
+            </a:r>
+            <a:endParaRPr lang="he-IL" dirty="0"/>
+          </a:p>
+        </p:txBody>
+      </p:sp>
+      <p:sp>
+        <p:nvSpPr>
+          <p:cNvPr id="18" name="TextBox 17">
+            <a:extLst>
+              <a:ext uri="{FF2B5EF4-FFF2-40B4-BE49-F238E27FC236}">
+                <a16:creationId xmlns:a16="http://schemas.microsoft.com/office/drawing/2014/main" id="{B3EF8822-AD8D-4C8E-9D8C-68F764EDAD5A}"/>
+              </a:ext>
+            </a:extLst>
+          </p:cNvPr>
+          <p:cNvSpPr txBox="1"/>
+          <p:nvPr/>
+        </p:nvSpPr>
+        <p:spPr>
+          <a:xfrm>
+            <a:off x="1446746" y="3059668"/>
+            <a:ext cx="789140" cy="369332"/>
+          </a:xfrm>
+          <a:prstGeom prst="rect">
+            <a:avLst/>
+          </a:prstGeom>
+          <a:noFill/>
+        </p:spPr>
+        <p:txBody>
+          <a:bodyPr wrap="square" rtlCol="1">
+            <a:spAutoFit/>
+          </a:bodyPr>
+          <a:lstStyle/>
+          <a:p>
+            <a:r>
+              <a:rPr lang="en-US" dirty="0"/>
+              <a:t>250</a:t>
+            </a:r>
+            <a:endParaRPr lang="he-IL" dirty="0"/>
+          </a:p>
+        </p:txBody>
+      </p:sp>
+      <p:sp>
+        <p:nvSpPr>
+          <p:cNvPr id="19" name="TextBox 18">
+            <a:extLst>
+              <a:ext uri="{FF2B5EF4-FFF2-40B4-BE49-F238E27FC236}">
+                <a16:creationId xmlns:a16="http://schemas.microsoft.com/office/drawing/2014/main" id="{A840D7FD-684A-460F-A387-DC28A53DFBE2}"/>
+              </a:ext>
+            </a:extLst>
+          </p:cNvPr>
+          <p:cNvSpPr txBox="1"/>
+          <p:nvPr/>
+        </p:nvSpPr>
+        <p:spPr>
+          <a:xfrm>
+            <a:off x="1419751" y="4773748"/>
+            <a:ext cx="789140" cy="369332"/>
+          </a:xfrm>
+          <a:prstGeom prst="rect">
+            <a:avLst/>
+          </a:prstGeom>
+          <a:noFill/>
+        </p:spPr>
+        <p:txBody>
+          <a:bodyPr wrap="square" rtlCol="1">
+            <a:spAutoFit/>
+          </a:bodyPr>
+          <a:lstStyle/>
+          <a:p>
+            <a:r>
+              <a:rPr lang="en-US" dirty="0"/>
+              <a:t>50</a:t>
+            </a:r>
+            <a:endParaRPr lang="he-IL" dirty="0"/>
+          </a:p>
+        </p:txBody>
+      </p:sp>
+      <p:sp>
+        <p:nvSpPr>
+          <p:cNvPr id="23" name="TextBox 22">
+            <a:extLst>
+              <a:ext uri="{FF2B5EF4-FFF2-40B4-BE49-F238E27FC236}">
+                <a16:creationId xmlns:a16="http://schemas.microsoft.com/office/drawing/2014/main" id="{9FCD9748-F86A-457D-BEF5-0441F5D50534}"/>
+              </a:ext>
+            </a:extLst>
+          </p:cNvPr>
+          <p:cNvSpPr txBox="1"/>
+          <p:nvPr/>
+        </p:nvSpPr>
+        <p:spPr>
+          <a:xfrm>
+            <a:off x="1433708" y="4353928"/>
+            <a:ext cx="789140" cy="369332"/>
+          </a:xfrm>
+          <a:prstGeom prst="rect">
+            <a:avLst/>
+          </a:prstGeom>
+          <a:noFill/>
+        </p:spPr>
+        <p:txBody>
+          <a:bodyPr wrap="square" rtlCol="1">
+            <a:spAutoFit/>
+          </a:bodyPr>
+          <a:lstStyle/>
+          <a:p>
+            <a:r>
+              <a:rPr lang="en-US" dirty="0"/>
+              <a:t>100</a:t>
+            </a:r>
+            <a:endParaRPr lang="he-IL" dirty="0"/>
+          </a:p>
+        </p:txBody>
+      </p:sp>
+      <p:sp>
+        <p:nvSpPr>
+          <p:cNvPr id="24" name="TextBox 23">
+            <a:extLst>
+              <a:ext uri="{FF2B5EF4-FFF2-40B4-BE49-F238E27FC236}">
+                <a16:creationId xmlns:a16="http://schemas.microsoft.com/office/drawing/2014/main" id="{CF747CC7-DB2C-4F91-926E-B4B198BF6C98}"/>
+              </a:ext>
+            </a:extLst>
+          </p:cNvPr>
+          <p:cNvSpPr txBox="1"/>
+          <p:nvPr/>
+        </p:nvSpPr>
+        <p:spPr>
+          <a:xfrm>
+            <a:off x="1433708" y="5229807"/>
+            <a:ext cx="789140" cy="369332"/>
+          </a:xfrm>
+          <a:prstGeom prst="rect">
+            <a:avLst/>
+          </a:prstGeom>
+          <a:noFill/>
+        </p:spPr>
+        <p:txBody>
+          <a:bodyPr wrap="square" rtlCol="1">
+            <a:spAutoFit/>
+          </a:bodyPr>
+          <a:lstStyle/>
+          <a:p>
+            <a:r>
+              <a:rPr lang="en-US" dirty="0"/>
+              <a:t>10</a:t>
+            </a:r>
+            <a:endParaRPr lang="he-IL" dirty="0"/>
+          </a:p>
+        </p:txBody>
+      </p:sp>
+      <p:sp>
+        <p:nvSpPr>
+          <p:cNvPr id="25" name="TextBox 24">
+            <a:extLst>
+              <a:ext uri="{FF2B5EF4-FFF2-40B4-BE49-F238E27FC236}">
+                <a16:creationId xmlns:a16="http://schemas.microsoft.com/office/drawing/2014/main" id="{D7A4B1A2-4364-4350-84A9-7F3DA84758A7}"/>
+              </a:ext>
+            </a:extLst>
+          </p:cNvPr>
+          <p:cNvSpPr txBox="1"/>
+          <p:nvPr/>
+        </p:nvSpPr>
+        <p:spPr>
+          <a:xfrm>
+            <a:off x="1426730" y="2687115"/>
+            <a:ext cx="789140" cy="369332"/>
+          </a:xfrm>
+          <a:prstGeom prst="rect">
+            <a:avLst/>
+          </a:prstGeom>
+          <a:noFill/>
+        </p:spPr>
+        <p:txBody>
+          <a:bodyPr wrap="square" rtlCol="1">
+            <a:spAutoFit/>
+          </a:bodyPr>
+          <a:lstStyle/>
+          <a:p>
+            <a:r>
+              <a:rPr lang="en-US" dirty="0"/>
+              <a:t>300</a:t>
+            </a:r>
+            <a:endParaRPr lang="he-IL" dirty="0"/>
+          </a:p>
+        </p:txBody>
+      </p:sp>
+      <p:sp>
+        <p:nvSpPr>
+          <p:cNvPr id="26" name="TextBox 25">
+            <a:extLst>
+              <a:ext uri="{FF2B5EF4-FFF2-40B4-BE49-F238E27FC236}">
+                <a16:creationId xmlns:a16="http://schemas.microsoft.com/office/drawing/2014/main" id="{B9318630-A3B1-43F0-9746-1FA9864A7B4E}"/>
+              </a:ext>
+            </a:extLst>
+          </p:cNvPr>
+          <p:cNvSpPr txBox="1"/>
+          <p:nvPr/>
+        </p:nvSpPr>
+        <p:spPr>
+          <a:xfrm>
+            <a:off x="1433708" y="3476081"/>
+            <a:ext cx="789140" cy="369332"/>
+          </a:xfrm>
+          <a:prstGeom prst="rect">
+            <a:avLst/>
+          </a:prstGeom>
+          <a:noFill/>
+        </p:spPr>
+        <p:txBody>
+          <a:bodyPr wrap="square" rtlCol="1">
+            <a:spAutoFit/>
+          </a:bodyPr>
+          <a:lstStyle/>
+          <a:p>
+            <a:r>
+              <a:rPr lang="en-US" dirty="0"/>
+              <a:t>200</a:t>
+            </a:r>
+            <a:endParaRPr lang="he-IL" dirty="0"/>
+          </a:p>
+        </p:txBody>
+      </p:sp>
+      <p:sp>
+        <p:nvSpPr>
+          <p:cNvPr id="27" name="TextBox 26">
+            <a:extLst>
+              <a:ext uri="{FF2B5EF4-FFF2-40B4-BE49-F238E27FC236}">
+                <a16:creationId xmlns:a16="http://schemas.microsoft.com/office/drawing/2014/main" id="{D7E49B80-8F04-41AD-919B-4ED477C97C35}"/>
+              </a:ext>
+            </a:extLst>
+          </p:cNvPr>
+          <p:cNvSpPr txBox="1"/>
+          <p:nvPr/>
+        </p:nvSpPr>
+        <p:spPr>
+          <a:xfrm>
+            <a:off x="1991651" y="5880158"/>
+            <a:ext cx="1465534" cy="369332"/>
+          </a:xfrm>
+          <a:prstGeom prst="rect">
+            <a:avLst/>
+          </a:prstGeom>
+          <a:noFill/>
+        </p:spPr>
+        <p:txBody>
+          <a:bodyPr wrap="square" rtlCol="1">
+            <a:spAutoFit/>
+          </a:bodyPr>
+          <a:lstStyle/>
+          <a:p>
+            <a:r>
+              <a:rPr lang="en-US" dirty="0"/>
+              <a:t>Securing </a:t>
+            </a:r>
+            <a:endParaRPr lang="he-IL" dirty="0"/>
+          </a:p>
+        </p:txBody>
+      </p:sp>
+      <p:sp>
+        <p:nvSpPr>
+          <p:cNvPr id="28" name="TextBox 27">
+            <a:extLst>
+              <a:ext uri="{FF2B5EF4-FFF2-40B4-BE49-F238E27FC236}">
+                <a16:creationId xmlns:a16="http://schemas.microsoft.com/office/drawing/2014/main" id="{45943BDC-E878-454D-9761-B1E1CEEF0572}"/>
+              </a:ext>
+            </a:extLst>
+          </p:cNvPr>
+          <p:cNvSpPr txBox="1"/>
+          <p:nvPr/>
+        </p:nvSpPr>
+        <p:spPr>
+          <a:xfrm>
+            <a:off x="3319397" y="5880158"/>
+            <a:ext cx="1327755" cy="369332"/>
+          </a:xfrm>
+          <a:prstGeom prst="rect">
+            <a:avLst/>
+          </a:prstGeom>
+          <a:noFill/>
+        </p:spPr>
+        <p:txBody>
+          <a:bodyPr wrap="square" rtlCol="1">
+            <a:spAutoFit/>
+          </a:bodyPr>
+          <a:lstStyle/>
+          <a:p>
+            <a:r>
+              <a:rPr lang="en-US" dirty="0"/>
+              <a:t>Cleaning </a:t>
+            </a:r>
+            <a:endParaRPr lang="he-IL" dirty="0"/>
+          </a:p>
+        </p:txBody>
+      </p:sp>
+      <p:sp>
+        <p:nvSpPr>
+          <p:cNvPr id="29" name="TextBox 28">
+            <a:extLst>
+              <a:ext uri="{FF2B5EF4-FFF2-40B4-BE49-F238E27FC236}">
+                <a16:creationId xmlns:a16="http://schemas.microsoft.com/office/drawing/2014/main" id="{E8665DA1-5E55-484B-9700-A77837CD6ADD}"/>
+              </a:ext>
+            </a:extLst>
+          </p:cNvPr>
+          <p:cNvSpPr txBox="1"/>
+          <p:nvPr/>
+        </p:nvSpPr>
+        <p:spPr>
+          <a:xfrm>
+            <a:off x="3983274" y="5880159"/>
+            <a:ext cx="1753640" cy="369332"/>
+          </a:xfrm>
+          <a:prstGeom prst="rect">
+            <a:avLst/>
+          </a:prstGeom>
+          <a:noFill/>
+        </p:spPr>
+        <p:txBody>
+          <a:bodyPr wrap="square" rtlCol="1">
+            <a:spAutoFit/>
+          </a:bodyPr>
+          <a:lstStyle/>
+          <a:p>
+            <a:r>
+              <a:rPr lang="en-US" dirty="0"/>
+              <a:t>Dean </a:t>
+            </a:r>
+            <a:endParaRPr lang="he-IL" dirty="0"/>
+          </a:p>
+        </p:txBody>
+      </p:sp>
+      <p:sp>
+        <p:nvSpPr>
+          <p:cNvPr id="30" name="TextBox 29">
+            <a:extLst>
+              <a:ext uri="{FF2B5EF4-FFF2-40B4-BE49-F238E27FC236}">
+                <a16:creationId xmlns:a16="http://schemas.microsoft.com/office/drawing/2014/main" id="{9F3E035B-C150-4F4D-BB71-2EDF9B28F410}"/>
+              </a:ext>
+            </a:extLst>
+          </p:cNvPr>
+          <p:cNvSpPr txBox="1"/>
+          <p:nvPr/>
+        </p:nvSpPr>
+        <p:spPr>
+          <a:xfrm>
+            <a:off x="5916464" y="5880158"/>
+            <a:ext cx="1628386" cy="369332"/>
+          </a:xfrm>
+          <a:prstGeom prst="rect">
+            <a:avLst/>
+          </a:prstGeom>
+          <a:noFill/>
+        </p:spPr>
+        <p:txBody>
+          <a:bodyPr wrap="square" rtlCol="1">
+            <a:spAutoFit/>
+          </a:bodyPr>
+          <a:lstStyle/>
+          <a:p>
+            <a:r>
+              <a:rPr lang="en-US" dirty="0"/>
+              <a:t>Maintenance </a:t>
+            </a:r>
+            <a:endParaRPr lang="he-IL" dirty="0"/>
+          </a:p>
+        </p:txBody>
+      </p:sp>
+      <p:sp>
+        <p:nvSpPr>
+          <p:cNvPr id="31" name="TextBox 30">
+            <a:extLst>
+              <a:ext uri="{FF2B5EF4-FFF2-40B4-BE49-F238E27FC236}">
+                <a16:creationId xmlns:a16="http://schemas.microsoft.com/office/drawing/2014/main" id="{2AA37F1E-12FC-45F5-A9C3-57AD911BAE43}"/>
+              </a:ext>
+            </a:extLst>
+          </p:cNvPr>
+          <p:cNvSpPr txBox="1"/>
+          <p:nvPr/>
+        </p:nvSpPr>
+        <p:spPr>
+          <a:xfrm>
+            <a:off x="7536505" y="5884270"/>
+            <a:ext cx="2275555" cy="369332"/>
+          </a:xfrm>
+          <a:prstGeom prst="rect">
+            <a:avLst/>
+          </a:prstGeom>
+          <a:noFill/>
+        </p:spPr>
+        <p:txBody>
+          <a:bodyPr wrap="square" rtlCol="1">
+            <a:spAutoFit/>
+          </a:bodyPr>
+          <a:lstStyle/>
+          <a:p>
+            <a:r>
+              <a:rPr lang="en-US" dirty="0"/>
+              <a:t>Students Association</a:t>
+            </a:r>
+            <a:endParaRPr lang="he-IL" dirty="0"/>
+          </a:p>
+        </p:txBody>
+      </p:sp>
+      <p:sp>
+        <p:nvSpPr>
+          <p:cNvPr id="32" name="מלבן 31">
+            <a:extLst>
+              <a:ext uri="{FF2B5EF4-FFF2-40B4-BE49-F238E27FC236}">
+                <a16:creationId xmlns:a16="http://schemas.microsoft.com/office/drawing/2014/main" id="{B9DF018A-8D5C-4BA4-A2E9-6BBD00880238}"/>
               </a:ext>
             </a:extLst>
           </p:cNvPr>
@@ -15345,20 +15479,19 @@
         </p:nvSpPr>
         <p:spPr>
           <a:xfrm>
-            <a:off x="10669262" y="5832347"/>
-            <a:ext cx="942930" cy="931691"/>
-          </a:xfrm>
-          <a:prstGeom prst="ellipse">
+            <a:off x="2668044" y="5336089"/>
+            <a:ext cx="438403" cy="450937"/>
+          </a:xfrm>
+          <a:prstGeom prst="rect">
             <a:avLst/>
           </a:prstGeom>
           <a:solidFill>
             <a:srgbClr val="92D050"/>
           </a:solidFill>
-          <a:ln w="19050">
+          <a:ln w="28575">
             <a:solidFill>
               <a:schemeClr val="accent6">
-                <a:lumMod val="60000"/>
-                <a:lumOff val="40000"/>
+                <a:lumMod val="75000"/>
               </a:schemeClr>
             </a:solidFill>
           </a:ln>
@@ -15384,6 +15517,530 @@
           <a:lstStyle/>
           <a:p>
             <a:pPr algn="ctr"/>
+            <a:endParaRPr lang="he-IL"/>
+          </a:p>
+        </p:txBody>
+      </p:sp>
+      <p:sp>
+        <p:nvSpPr>
+          <p:cNvPr id="33" name="מלבן 32">
+            <a:extLst>
+              <a:ext uri="{FF2B5EF4-FFF2-40B4-BE49-F238E27FC236}">
+                <a16:creationId xmlns:a16="http://schemas.microsoft.com/office/drawing/2014/main" id="{1D574789-0304-4757-9B56-64FAB6821415}"/>
+              </a:ext>
+            </a:extLst>
+          </p:cNvPr>
+          <p:cNvSpPr/>
+          <p:nvPr/>
+        </p:nvSpPr>
+        <p:spPr>
+          <a:xfrm>
+            <a:off x="3876806" y="3895715"/>
+            <a:ext cx="438403" cy="1891311"/>
+          </a:xfrm>
+          <a:prstGeom prst="rect">
+            <a:avLst/>
+          </a:prstGeom>
+          <a:solidFill>
+            <a:srgbClr val="92D050"/>
+          </a:solidFill>
+          <a:ln w="28575">
+            <a:solidFill>
+              <a:schemeClr val="accent6">
+                <a:lumMod val="75000"/>
+              </a:schemeClr>
+            </a:solidFill>
+          </a:ln>
+        </p:spPr>
+        <p:style>
+          <a:lnRef idx="2">
+            <a:schemeClr val="accent1">
+              <a:shade val="50000"/>
+            </a:schemeClr>
+          </a:lnRef>
+          <a:fillRef idx="1">
+            <a:schemeClr val="accent1"/>
+          </a:fillRef>
+          <a:effectRef idx="0">
+            <a:schemeClr val="accent1"/>
+          </a:effectRef>
+          <a:fontRef idx="minor">
+            <a:schemeClr val="lt1"/>
+          </a:fontRef>
+        </p:style>
+        <p:txBody>
+          <a:bodyPr rtlCol="1" anchor="ctr"/>
+          <a:lstStyle/>
+          <a:p>
+            <a:pPr algn="ctr"/>
+            <a:endParaRPr lang="he-IL"/>
+          </a:p>
+        </p:txBody>
+      </p:sp>
+      <p:sp>
+        <p:nvSpPr>
+          <p:cNvPr id="34" name="מלבן 33">
+            <a:extLst>
+              <a:ext uri="{FF2B5EF4-FFF2-40B4-BE49-F238E27FC236}">
+                <a16:creationId xmlns:a16="http://schemas.microsoft.com/office/drawing/2014/main" id="{A58C9825-C3E4-4B8E-A829-2CEBF907EF57}"/>
+              </a:ext>
+            </a:extLst>
+          </p:cNvPr>
+          <p:cNvSpPr/>
+          <p:nvPr/>
+        </p:nvSpPr>
+        <p:spPr>
+          <a:xfrm>
+            <a:off x="5160716" y="3767238"/>
+            <a:ext cx="438403" cy="2019788"/>
+          </a:xfrm>
+          <a:prstGeom prst="rect">
+            <a:avLst/>
+          </a:prstGeom>
+          <a:solidFill>
+            <a:srgbClr val="92D050"/>
+          </a:solidFill>
+          <a:ln w="28575">
+            <a:solidFill>
+              <a:schemeClr val="accent6">
+                <a:lumMod val="75000"/>
+              </a:schemeClr>
+            </a:solidFill>
+          </a:ln>
+        </p:spPr>
+        <p:style>
+          <a:lnRef idx="2">
+            <a:schemeClr val="accent1">
+              <a:shade val="50000"/>
+            </a:schemeClr>
+          </a:lnRef>
+          <a:fillRef idx="1">
+            <a:schemeClr val="accent1"/>
+          </a:fillRef>
+          <a:effectRef idx="0">
+            <a:schemeClr val="accent1"/>
+          </a:effectRef>
+          <a:fontRef idx="minor">
+            <a:schemeClr val="lt1"/>
+          </a:fontRef>
+        </p:style>
+        <p:txBody>
+          <a:bodyPr rtlCol="1" anchor="ctr"/>
+          <a:lstStyle/>
+          <a:p>
+            <a:pPr algn="ctr"/>
+            <a:endParaRPr lang="he-IL"/>
+          </a:p>
+        </p:txBody>
+      </p:sp>
+      <p:sp>
+        <p:nvSpPr>
+          <p:cNvPr id="35" name="מלבן 34">
+            <a:extLst>
+              <a:ext uri="{FF2B5EF4-FFF2-40B4-BE49-F238E27FC236}">
+                <a16:creationId xmlns:a16="http://schemas.microsoft.com/office/drawing/2014/main" id="{056A8E07-0F56-4147-9E3C-337329C9A43E}"/>
+              </a:ext>
+            </a:extLst>
+          </p:cNvPr>
+          <p:cNvSpPr/>
+          <p:nvPr/>
+        </p:nvSpPr>
+        <p:spPr>
+          <a:xfrm>
+            <a:off x="6642981" y="3056447"/>
+            <a:ext cx="438403" cy="2730579"/>
+          </a:xfrm>
+          <a:prstGeom prst="rect">
+            <a:avLst/>
+          </a:prstGeom>
+          <a:solidFill>
+            <a:srgbClr val="92D050"/>
+          </a:solidFill>
+          <a:ln w="28575">
+            <a:solidFill>
+              <a:schemeClr val="accent6">
+                <a:lumMod val="75000"/>
+              </a:schemeClr>
+            </a:solidFill>
+          </a:ln>
+        </p:spPr>
+        <p:style>
+          <a:lnRef idx="2">
+            <a:schemeClr val="accent1">
+              <a:shade val="50000"/>
+            </a:schemeClr>
+          </a:lnRef>
+          <a:fillRef idx="1">
+            <a:schemeClr val="accent1"/>
+          </a:fillRef>
+          <a:effectRef idx="0">
+            <a:schemeClr val="accent1"/>
+          </a:effectRef>
+          <a:fontRef idx="minor">
+            <a:schemeClr val="lt1"/>
+          </a:fontRef>
+        </p:style>
+        <p:txBody>
+          <a:bodyPr rtlCol="1" anchor="ctr"/>
+          <a:lstStyle/>
+          <a:p>
+            <a:pPr algn="ctr"/>
+            <a:endParaRPr lang="he-IL"/>
+          </a:p>
+        </p:txBody>
+      </p:sp>
+      <p:sp>
+        <p:nvSpPr>
+          <p:cNvPr id="36" name="מלבן 35">
+            <a:extLst>
+              <a:ext uri="{FF2B5EF4-FFF2-40B4-BE49-F238E27FC236}">
+                <a16:creationId xmlns:a16="http://schemas.microsoft.com/office/drawing/2014/main" id="{4031DEC8-A650-4553-BF5B-A926999EECFA}"/>
+              </a:ext>
+            </a:extLst>
+          </p:cNvPr>
+          <p:cNvSpPr/>
+          <p:nvPr/>
+        </p:nvSpPr>
+        <p:spPr>
+          <a:xfrm>
+            <a:off x="8455080" y="5143079"/>
+            <a:ext cx="438403" cy="643947"/>
+          </a:xfrm>
+          <a:prstGeom prst="rect">
+            <a:avLst/>
+          </a:prstGeom>
+          <a:solidFill>
+            <a:srgbClr val="92D050"/>
+          </a:solidFill>
+          <a:ln w="28575">
+            <a:solidFill>
+              <a:schemeClr val="accent6">
+                <a:lumMod val="75000"/>
+              </a:schemeClr>
+            </a:solidFill>
+          </a:ln>
+        </p:spPr>
+        <p:style>
+          <a:lnRef idx="2">
+            <a:schemeClr val="accent1">
+              <a:shade val="50000"/>
+            </a:schemeClr>
+          </a:lnRef>
+          <a:fillRef idx="1">
+            <a:schemeClr val="accent1"/>
+          </a:fillRef>
+          <a:effectRef idx="0">
+            <a:schemeClr val="accent1"/>
+          </a:effectRef>
+          <a:fontRef idx="minor">
+            <a:schemeClr val="lt1"/>
+          </a:fontRef>
+        </p:style>
+        <p:txBody>
+          <a:bodyPr rtlCol="1" anchor="ctr"/>
+          <a:lstStyle/>
+          <a:p>
+            <a:pPr algn="ctr"/>
+            <a:endParaRPr lang="he-IL"/>
+          </a:p>
+        </p:txBody>
+      </p:sp>
+      <p:sp>
+        <p:nvSpPr>
+          <p:cNvPr id="38" name="TextBox 37">
+            <a:extLst>
+              <a:ext uri="{FF2B5EF4-FFF2-40B4-BE49-F238E27FC236}">
+                <a16:creationId xmlns:a16="http://schemas.microsoft.com/office/drawing/2014/main" id="{871A2E64-3208-4676-9645-03870A0CCA22}"/>
+              </a:ext>
+            </a:extLst>
+          </p:cNvPr>
+          <p:cNvSpPr txBox="1"/>
+          <p:nvPr/>
+        </p:nvSpPr>
+        <p:spPr>
+          <a:xfrm>
+            <a:off x="6574087" y="2601572"/>
+            <a:ext cx="576189" cy="369332"/>
+          </a:xfrm>
+          <a:prstGeom prst="rect">
+            <a:avLst/>
+          </a:prstGeom>
+          <a:noFill/>
+        </p:spPr>
+        <p:txBody>
+          <a:bodyPr wrap="square" rtlCol="1">
+            <a:spAutoFit/>
+          </a:bodyPr>
+          <a:lstStyle/>
+          <a:p>
+            <a:r>
+              <a:rPr lang="he-IL" dirty="0"/>
+              <a:t>275</a:t>
+            </a:r>
+          </a:p>
+        </p:txBody>
+      </p:sp>
+      <p:sp>
+        <p:nvSpPr>
+          <p:cNvPr id="41" name="TextBox 40">
+            <a:extLst>
+              <a:ext uri="{FF2B5EF4-FFF2-40B4-BE49-F238E27FC236}">
+                <a16:creationId xmlns:a16="http://schemas.microsoft.com/office/drawing/2014/main" id="{718951D3-AE54-43AF-B183-7296B8A42310}"/>
+              </a:ext>
+            </a:extLst>
+          </p:cNvPr>
+          <p:cNvSpPr txBox="1"/>
+          <p:nvPr/>
+        </p:nvSpPr>
+        <p:spPr>
+          <a:xfrm>
+            <a:off x="8413313" y="4773748"/>
+            <a:ext cx="480170" cy="369332"/>
+          </a:xfrm>
+          <a:prstGeom prst="rect">
+            <a:avLst/>
+          </a:prstGeom>
+          <a:noFill/>
+        </p:spPr>
+        <p:txBody>
+          <a:bodyPr wrap="square" rtlCol="1">
+            <a:spAutoFit/>
+          </a:bodyPr>
+          <a:lstStyle/>
+          <a:p>
+            <a:r>
+              <a:rPr lang="he-IL" dirty="0"/>
+              <a:t>40</a:t>
+            </a:r>
+          </a:p>
+        </p:txBody>
+      </p:sp>
+      <p:sp>
+        <p:nvSpPr>
+          <p:cNvPr id="42" name="TextBox 41">
+            <a:extLst>
+              <a:ext uri="{FF2B5EF4-FFF2-40B4-BE49-F238E27FC236}">
+                <a16:creationId xmlns:a16="http://schemas.microsoft.com/office/drawing/2014/main" id="{A8A5ADE7-8AE1-419B-846E-C4E040CCC93E}"/>
+              </a:ext>
+            </a:extLst>
+          </p:cNvPr>
+          <p:cNvSpPr txBox="1"/>
+          <p:nvPr/>
+        </p:nvSpPr>
+        <p:spPr>
+          <a:xfrm>
+            <a:off x="4837148" y="3358836"/>
+            <a:ext cx="839234" cy="369332"/>
+          </a:xfrm>
+          <a:prstGeom prst="rect">
+            <a:avLst/>
+          </a:prstGeom>
+          <a:noFill/>
+        </p:spPr>
+        <p:txBody>
+          <a:bodyPr wrap="square" rtlCol="1">
+            <a:spAutoFit/>
+          </a:bodyPr>
+          <a:lstStyle/>
+          <a:p>
+            <a:r>
+              <a:rPr lang="he-IL" dirty="0"/>
+              <a:t>200</a:t>
+            </a:r>
+          </a:p>
+        </p:txBody>
+      </p:sp>
+      <p:sp>
+        <p:nvSpPr>
+          <p:cNvPr id="43" name="TextBox 42">
+            <a:extLst>
+              <a:ext uri="{FF2B5EF4-FFF2-40B4-BE49-F238E27FC236}">
+                <a16:creationId xmlns:a16="http://schemas.microsoft.com/office/drawing/2014/main" id="{E456ACF4-64A6-4ACB-BB4F-C621149B506E}"/>
+              </a:ext>
+            </a:extLst>
+          </p:cNvPr>
+          <p:cNvSpPr txBox="1"/>
+          <p:nvPr/>
+        </p:nvSpPr>
+        <p:spPr>
+          <a:xfrm>
+            <a:off x="3554272" y="3539381"/>
+            <a:ext cx="789127" cy="369332"/>
+          </a:xfrm>
+          <a:prstGeom prst="rect">
+            <a:avLst/>
+          </a:prstGeom>
+          <a:noFill/>
+        </p:spPr>
+        <p:txBody>
+          <a:bodyPr wrap="square" rtlCol="1">
+            <a:spAutoFit/>
+          </a:bodyPr>
+          <a:lstStyle/>
+          <a:p>
+            <a:r>
+              <a:rPr lang="he-IL" dirty="0"/>
+              <a:t>160</a:t>
+            </a:r>
+          </a:p>
+        </p:txBody>
+      </p:sp>
+      <p:sp>
+        <p:nvSpPr>
+          <p:cNvPr id="44" name="TextBox 43">
+            <a:extLst>
+              <a:ext uri="{FF2B5EF4-FFF2-40B4-BE49-F238E27FC236}">
+                <a16:creationId xmlns:a16="http://schemas.microsoft.com/office/drawing/2014/main" id="{BEAAED97-1023-4ADF-A587-0B4360EBDE79}"/>
+              </a:ext>
+            </a:extLst>
+          </p:cNvPr>
+          <p:cNvSpPr txBox="1"/>
+          <p:nvPr/>
+        </p:nvSpPr>
+        <p:spPr>
+          <a:xfrm>
+            <a:off x="2236805" y="4937904"/>
+            <a:ext cx="876822" cy="369332"/>
+          </a:xfrm>
+          <a:prstGeom prst="rect">
+            <a:avLst/>
+          </a:prstGeom>
+          <a:noFill/>
+        </p:spPr>
+        <p:txBody>
+          <a:bodyPr wrap="square" rtlCol="1">
+            <a:spAutoFit/>
+          </a:bodyPr>
+          <a:lstStyle/>
+          <a:p>
+            <a:r>
+              <a:rPr lang="he-IL" dirty="0"/>
+              <a:t>20</a:t>
+            </a:r>
+          </a:p>
+        </p:txBody>
+      </p:sp>
+      <p:sp>
+        <p:nvSpPr>
+          <p:cNvPr id="46" name="TextBox 45">
+            <a:extLst>
+              <a:ext uri="{FF2B5EF4-FFF2-40B4-BE49-F238E27FC236}">
+                <a16:creationId xmlns:a16="http://schemas.microsoft.com/office/drawing/2014/main" id="{8AE7AF00-1948-4797-BA21-82B4998F5306}"/>
+              </a:ext>
+            </a:extLst>
+          </p:cNvPr>
+          <p:cNvSpPr txBox="1"/>
+          <p:nvPr/>
+        </p:nvSpPr>
+        <p:spPr>
+          <a:xfrm>
+            <a:off x="9883060" y="5573877"/>
+            <a:ext cx="1691011" cy="369332"/>
+          </a:xfrm>
+          <a:prstGeom prst="rect">
+            <a:avLst/>
+          </a:prstGeom>
+          <a:noFill/>
+        </p:spPr>
+        <p:txBody>
+          <a:bodyPr wrap="square" rtlCol="1">
+            <a:spAutoFit/>
+          </a:bodyPr>
+          <a:lstStyle/>
+          <a:p>
+            <a:r>
+              <a:rPr lang="en-US" dirty="0"/>
+              <a:t>Supervisor </a:t>
+            </a:r>
+            <a:endParaRPr lang="he-IL" dirty="0"/>
+          </a:p>
+        </p:txBody>
+      </p:sp>
+      <p:pic>
+        <p:nvPicPr>
+          <p:cNvPr id="47" name="תמונה 46">
+            <a:hlinkClick r:id="rId2" action="ppaction://hlinksldjump"/>
+            <a:extLst>
+              <a:ext uri="{FF2B5EF4-FFF2-40B4-BE49-F238E27FC236}">
+                <a16:creationId xmlns:a16="http://schemas.microsoft.com/office/drawing/2014/main" id="{F58C4563-86F7-48D8-92AB-E2497D45AAC2}"/>
+              </a:ext>
+            </a:extLst>
+          </p:cNvPr>
+          <p:cNvPicPr>
+            <a:picLocks noChangeAspect="1"/>
+          </p:cNvPicPr>
+          <p:nvPr/>
+        </p:nvPicPr>
+        <p:blipFill>
+          <a:blip r:embed="rId3"/>
+          <a:stretch>
+            <a:fillRect/>
+          </a:stretch>
+        </p:blipFill>
+        <p:spPr>
+          <a:xfrm>
+            <a:off x="79893" y="199347"/>
+            <a:ext cx="499915" cy="499915"/>
+          </a:xfrm>
+          <a:prstGeom prst="rect">
+            <a:avLst/>
+          </a:prstGeom>
+        </p:spPr>
+      </p:pic>
+      <p:sp>
+        <p:nvSpPr>
+          <p:cNvPr id="48" name="אליפסה 47">
+            <a:hlinkClick r:id="rId4" action="ppaction://hlinksldjump"/>
+            <a:extLst>
+              <a:ext uri="{FF2B5EF4-FFF2-40B4-BE49-F238E27FC236}">
+                <a16:creationId xmlns:a16="http://schemas.microsoft.com/office/drawing/2014/main" id="{E97464E1-1896-422E-A7E0-BB4C5C24790E}"/>
+              </a:ext>
+            </a:extLst>
+          </p:cNvPr>
+          <p:cNvSpPr/>
+          <p:nvPr/>
+        </p:nvSpPr>
+        <p:spPr>
+          <a:xfrm>
+            <a:off x="11117396" y="5916738"/>
+            <a:ext cx="934594" cy="868640"/>
+          </a:xfrm>
+          <a:prstGeom prst="ellipse">
+            <a:avLst/>
+          </a:prstGeom>
+          <a:solidFill>
+            <a:srgbClr val="92D050"/>
+          </a:solidFill>
+          <a:ln w="19050">
+            <a:solidFill>
+              <a:schemeClr val="accent6">
+                <a:lumMod val="60000"/>
+                <a:lumOff val="40000"/>
+              </a:schemeClr>
+            </a:solidFill>
+          </a:ln>
+        </p:spPr>
+        <p:style>
+          <a:lnRef idx="2">
+            <a:schemeClr val="accent1">
+              <a:shade val="50000"/>
+            </a:schemeClr>
+          </a:lnRef>
+          <a:fillRef idx="1">
+            <a:schemeClr val="accent1"/>
+          </a:fillRef>
+          <a:effectRef idx="0">
+            <a:schemeClr val="accent1"/>
+          </a:effectRef>
+          <a:fontRef idx="minor">
+            <a:schemeClr val="lt1"/>
+          </a:fontRef>
+        </p:style>
+        <p:txBody>
+          <a:bodyPr rtlCol="1" anchor="ctr"/>
+          <a:lstStyle/>
+          <a:p>
+            <a:pPr algn="ctr"/>
             <a:r>
               <a:rPr lang="en-US" sz="2000" dirty="0">
                 <a:solidFill>
@@ -15402,41 +16059,10 @@
           </a:p>
         </p:txBody>
       </p:sp>
-      <p:pic>
-        <p:nvPicPr>
-          <p:cNvPr id="6" name="תמונה 5">
-            <a:hlinkClick r:id="rId3" action="ppaction://hlinksldjump"/>
-            <a:extLst>
-              <a:ext uri="{FF2B5EF4-FFF2-40B4-BE49-F238E27FC236}">
-                <a16:creationId xmlns:a16="http://schemas.microsoft.com/office/drawing/2014/main" id="{3B64EE67-A85E-4B07-BFF8-BBF553BE962E}"/>
-              </a:ext>
-            </a:extLst>
-          </p:cNvPr>
-          <p:cNvPicPr>
-            <a:picLocks noChangeAspect="1"/>
-          </p:cNvPicPr>
-          <p:nvPr/>
-        </p:nvPicPr>
-        <p:blipFill>
-          <a:blip r:embed="rId4"/>
-          <a:stretch>
-            <a:fillRect/>
-          </a:stretch>
-        </p:blipFill>
-        <p:spPr>
-          <a:xfrm>
-            <a:off x="79893" y="199347"/>
-            <a:ext cx="499915" cy="499915"/>
-          </a:xfrm>
-          <a:prstGeom prst="rect">
-            <a:avLst/>
-          </a:prstGeom>
-        </p:spPr>
-      </p:pic>
     </p:spTree>
     <p:extLst>
       <p:ext uri="{BB962C8B-B14F-4D97-AF65-F5344CB8AC3E}">
-        <p14:creationId xmlns:p14="http://schemas.microsoft.com/office/powerpoint/2010/main" val="2564198328"/>
+        <p14:creationId xmlns:p14="http://schemas.microsoft.com/office/powerpoint/2010/main" val="4044948089"/>
       </p:ext>
     </p:extLst>
   </p:cSld>
@@ -15468,1272 +16094,6 @@
           <p:cNvPr id="2" name="כותרת 1">
             <a:extLst>
               <a:ext uri="{FF2B5EF4-FFF2-40B4-BE49-F238E27FC236}">
-                <a16:creationId xmlns:a16="http://schemas.microsoft.com/office/drawing/2014/main" id="{7730EA33-6060-48D0-B095-74D69D091F9C}"/>
-              </a:ext>
-            </a:extLst>
-          </p:cNvPr>
-          <p:cNvSpPr>
-            <a:spLocks noGrp="1"/>
-          </p:cNvSpPr>
-          <p:nvPr>
-            <p:ph type="title"/>
-          </p:nvPr>
-        </p:nvSpPr>
-        <p:spPr>
-          <a:xfrm>
-            <a:off x="2222848" y="500062"/>
-            <a:ext cx="7746304" cy="1325563"/>
-          </a:xfrm>
-        </p:spPr>
-        <p:txBody>
-          <a:bodyPr>
-            <a:normAutofit fontScale="90000"/>
-          </a:bodyPr>
-          <a:lstStyle/>
-          <a:p>
-            <a:r>
-              <a:rPr lang="en-US" sz="7300" b="1" dirty="0">
-                <a:solidFill>
-                  <a:srgbClr val="92D050"/>
-                </a:solidFill>
-              </a:rPr>
-              <a:t>Events By supervisor</a:t>
-            </a:r>
-            <a:br>
-              <a:rPr lang="en-US" dirty="0">
-                <a:solidFill>
-                  <a:srgbClr val="92D050"/>
-                </a:solidFill>
-              </a:rPr>
-            </a:br>
-            <a:endParaRPr lang="he-IL" dirty="0"/>
-          </a:p>
-        </p:txBody>
-      </p:sp>
-      <p:cxnSp>
-        <p:nvCxnSpPr>
-          <p:cNvPr id="7" name="מחבר חץ ישר 6">
-            <a:extLst>
-              <a:ext uri="{FF2B5EF4-FFF2-40B4-BE49-F238E27FC236}">
-                <a16:creationId xmlns:a16="http://schemas.microsoft.com/office/drawing/2014/main" id="{2506DE58-E6C4-48FB-95C6-80F0C720E1E7}"/>
-              </a:ext>
-            </a:extLst>
-          </p:cNvPr>
-          <p:cNvCxnSpPr>
-            <a:cxnSpLocks/>
-          </p:cNvCxnSpPr>
-          <p:nvPr/>
-        </p:nvCxnSpPr>
-        <p:spPr>
-          <a:xfrm flipV="1">
-            <a:off x="2222848" y="1703540"/>
-            <a:ext cx="0" cy="4083486"/>
-          </a:xfrm>
-          <a:prstGeom prst="straightConnector1">
-            <a:avLst/>
-          </a:prstGeom>
-          <a:ln>
-            <a:solidFill>
-              <a:schemeClr val="accent6">
-                <a:lumMod val="50000"/>
-              </a:schemeClr>
-            </a:solidFill>
-            <a:tailEnd type="triangle"/>
-          </a:ln>
-        </p:spPr>
-        <p:style>
-          <a:lnRef idx="1">
-            <a:schemeClr val="accent1"/>
-          </a:lnRef>
-          <a:fillRef idx="0">
-            <a:schemeClr val="accent1"/>
-          </a:fillRef>
-          <a:effectRef idx="0">
-            <a:schemeClr val="accent1"/>
-          </a:effectRef>
-          <a:fontRef idx="minor">
-            <a:schemeClr val="tx1"/>
-          </a:fontRef>
-        </p:style>
-      </p:cxnSp>
-      <p:cxnSp>
-        <p:nvCxnSpPr>
-          <p:cNvPr id="9" name="מחבר חץ ישר 8">
-            <a:extLst>
-              <a:ext uri="{FF2B5EF4-FFF2-40B4-BE49-F238E27FC236}">
-                <a16:creationId xmlns:a16="http://schemas.microsoft.com/office/drawing/2014/main" id="{9571FF17-580B-42A1-93AB-F927F527EFCB}"/>
-              </a:ext>
-            </a:extLst>
-          </p:cNvPr>
-          <p:cNvCxnSpPr/>
-          <p:nvPr/>
-        </p:nvCxnSpPr>
-        <p:spPr>
-          <a:xfrm>
-            <a:off x="2222848" y="5787026"/>
-            <a:ext cx="8061020" cy="0"/>
-          </a:xfrm>
-          <a:prstGeom prst="straightConnector1">
-            <a:avLst/>
-          </a:prstGeom>
-          <a:ln>
-            <a:solidFill>
-              <a:schemeClr val="accent6">
-                <a:lumMod val="50000"/>
-              </a:schemeClr>
-            </a:solidFill>
-            <a:tailEnd type="triangle"/>
-          </a:ln>
-        </p:spPr>
-        <p:style>
-          <a:lnRef idx="1">
-            <a:schemeClr val="accent1"/>
-          </a:lnRef>
-          <a:fillRef idx="0">
-            <a:schemeClr val="accent1"/>
-          </a:fillRef>
-          <a:effectRef idx="0">
-            <a:schemeClr val="accent1"/>
-          </a:effectRef>
-          <a:fontRef idx="minor">
-            <a:schemeClr val="tx1"/>
-          </a:fontRef>
-        </p:style>
-      </p:cxnSp>
-      <p:sp>
-        <p:nvSpPr>
-          <p:cNvPr id="12" name="TextBox 11">
-            <a:extLst>
-              <a:ext uri="{FF2B5EF4-FFF2-40B4-BE49-F238E27FC236}">
-                <a16:creationId xmlns:a16="http://schemas.microsoft.com/office/drawing/2014/main" id="{A8504308-07EE-47A3-ACE8-6DBED4E8EC0D}"/>
-              </a:ext>
-            </a:extLst>
-          </p:cNvPr>
-          <p:cNvSpPr txBox="1"/>
-          <p:nvPr/>
-        </p:nvSpPr>
-        <p:spPr>
-          <a:xfrm>
-            <a:off x="1615858" y="1044683"/>
-            <a:ext cx="1240057" cy="646331"/>
-          </a:xfrm>
-          <a:prstGeom prst="rect">
-            <a:avLst/>
-          </a:prstGeom>
-          <a:noFill/>
-        </p:spPr>
-        <p:txBody>
-          <a:bodyPr wrap="square" rtlCol="1">
-            <a:spAutoFit/>
-          </a:bodyPr>
-          <a:lstStyle/>
-          <a:p>
-            <a:pPr algn="ctr"/>
-            <a:r>
-              <a:rPr lang="en-US" dirty="0"/>
-              <a:t>Amount of events</a:t>
-            </a:r>
-            <a:endParaRPr lang="he-IL" dirty="0"/>
-          </a:p>
-        </p:txBody>
-      </p:sp>
-      <p:sp>
-        <p:nvSpPr>
-          <p:cNvPr id="14" name="TextBox 13">
-            <a:extLst>
-              <a:ext uri="{FF2B5EF4-FFF2-40B4-BE49-F238E27FC236}">
-                <a16:creationId xmlns:a16="http://schemas.microsoft.com/office/drawing/2014/main" id="{82DBC2F1-C340-47EF-A1BA-494B368F6BCA}"/>
-              </a:ext>
-            </a:extLst>
-          </p:cNvPr>
-          <p:cNvSpPr txBox="1"/>
-          <p:nvPr/>
-        </p:nvSpPr>
-        <p:spPr>
-          <a:xfrm>
-            <a:off x="1419751" y="2311430"/>
-            <a:ext cx="789140" cy="369332"/>
-          </a:xfrm>
-          <a:prstGeom prst="rect">
-            <a:avLst/>
-          </a:prstGeom>
-          <a:noFill/>
-        </p:spPr>
-        <p:txBody>
-          <a:bodyPr wrap="square" rtlCol="1">
-            <a:spAutoFit/>
-          </a:bodyPr>
-          <a:lstStyle/>
-          <a:p>
-            <a:r>
-              <a:rPr lang="en-US" dirty="0"/>
-              <a:t>350</a:t>
-            </a:r>
-            <a:endParaRPr lang="he-IL" dirty="0"/>
-          </a:p>
-        </p:txBody>
-      </p:sp>
-      <p:sp>
-        <p:nvSpPr>
-          <p:cNvPr id="16" name="TextBox 15">
-            <a:extLst>
-              <a:ext uri="{FF2B5EF4-FFF2-40B4-BE49-F238E27FC236}">
-                <a16:creationId xmlns:a16="http://schemas.microsoft.com/office/drawing/2014/main" id="{BD9A2C19-DA7A-4193-AC00-D77DFA880628}"/>
-              </a:ext>
-            </a:extLst>
-          </p:cNvPr>
-          <p:cNvSpPr txBox="1"/>
-          <p:nvPr/>
-        </p:nvSpPr>
-        <p:spPr>
-          <a:xfrm>
-            <a:off x="1419751" y="3895715"/>
-            <a:ext cx="789140" cy="369332"/>
-          </a:xfrm>
-          <a:prstGeom prst="rect">
-            <a:avLst/>
-          </a:prstGeom>
-          <a:noFill/>
-        </p:spPr>
-        <p:txBody>
-          <a:bodyPr wrap="square" rtlCol="1">
-            <a:spAutoFit/>
-          </a:bodyPr>
-          <a:lstStyle/>
-          <a:p>
-            <a:r>
-              <a:rPr lang="en-US" dirty="0"/>
-              <a:t>150</a:t>
-            </a:r>
-            <a:endParaRPr lang="he-IL" dirty="0"/>
-          </a:p>
-        </p:txBody>
-      </p:sp>
-      <p:sp>
-        <p:nvSpPr>
-          <p:cNvPr id="18" name="TextBox 17">
-            <a:extLst>
-              <a:ext uri="{FF2B5EF4-FFF2-40B4-BE49-F238E27FC236}">
-                <a16:creationId xmlns:a16="http://schemas.microsoft.com/office/drawing/2014/main" id="{B3EF8822-AD8D-4C8E-9D8C-68F764EDAD5A}"/>
-              </a:ext>
-            </a:extLst>
-          </p:cNvPr>
-          <p:cNvSpPr txBox="1"/>
-          <p:nvPr/>
-        </p:nvSpPr>
-        <p:spPr>
-          <a:xfrm>
-            <a:off x="1446746" y="3059668"/>
-            <a:ext cx="789140" cy="369332"/>
-          </a:xfrm>
-          <a:prstGeom prst="rect">
-            <a:avLst/>
-          </a:prstGeom>
-          <a:noFill/>
-        </p:spPr>
-        <p:txBody>
-          <a:bodyPr wrap="square" rtlCol="1">
-            <a:spAutoFit/>
-          </a:bodyPr>
-          <a:lstStyle/>
-          <a:p>
-            <a:r>
-              <a:rPr lang="en-US" dirty="0"/>
-              <a:t>250</a:t>
-            </a:r>
-            <a:endParaRPr lang="he-IL" dirty="0"/>
-          </a:p>
-        </p:txBody>
-      </p:sp>
-      <p:sp>
-        <p:nvSpPr>
-          <p:cNvPr id="19" name="TextBox 18">
-            <a:extLst>
-              <a:ext uri="{FF2B5EF4-FFF2-40B4-BE49-F238E27FC236}">
-                <a16:creationId xmlns:a16="http://schemas.microsoft.com/office/drawing/2014/main" id="{A840D7FD-684A-460F-A387-DC28A53DFBE2}"/>
-              </a:ext>
-            </a:extLst>
-          </p:cNvPr>
-          <p:cNvSpPr txBox="1"/>
-          <p:nvPr/>
-        </p:nvSpPr>
-        <p:spPr>
-          <a:xfrm>
-            <a:off x="1419751" y="4773748"/>
-            <a:ext cx="789140" cy="369332"/>
-          </a:xfrm>
-          <a:prstGeom prst="rect">
-            <a:avLst/>
-          </a:prstGeom>
-          <a:noFill/>
-        </p:spPr>
-        <p:txBody>
-          <a:bodyPr wrap="square" rtlCol="1">
-            <a:spAutoFit/>
-          </a:bodyPr>
-          <a:lstStyle/>
-          <a:p>
-            <a:r>
-              <a:rPr lang="en-US" dirty="0"/>
-              <a:t>50</a:t>
-            </a:r>
-            <a:endParaRPr lang="he-IL" dirty="0"/>
-          </a:p>
-        </p:txBody>
-      </p:sp>
-      <p:sp>
-        <p:nvSpPr>
-          <p:cNvPr id="23" name="TextBox 22">
-            <a:extLst>
-              <a:ext uri="{FF2B5EF4-FFF2-40B4-BE49-F238E27FC236}">
-                <a16:creationId xmlns:a16="http://schemas.microsoft.com/office/drawing/2014/main" id="{9FCD9748-F86A-457D-BEF5-0441F5D50534}"/>
-              </a:ext>
-            </a:extLst>
-          </p:cNvPr>
-          <p:cNvSpPr txBox="1"/>
-          <p:nvPr/>
-        </p:nvSpPr>
-        <p:spPr>
-          <a:xfrm>
-            <a:off x="1433708" y="4353928"/>
-            <a:ext cx="789140" cy="369332"/>
-          </a:xfrm>
-          <a:prstGeom prst="rect">
-            <a:avLst/>
-          </a:prstGeom>
-          <a:noFill/>
-        </p:spPr>
-        <p:txBody>
-          <a:bodyPr wrap="square" rtlCol="1">
-            <a:spAutoFit/>
-          </a:bodyPr>
-          <a:lstStyle/>
-          <a:p>
-            <a:r>
-              <a:rPr lang="en-US" dirty="0"/>
-              <a:t>100</a:t>
-            </a:r>
-            <a:endParaRPr lang="he-IL" dirty="0"/>
-          </a:p>
-        </p:txBody>
-      </p:sp>
-      <p:sp>
-        <p:nvSpPr>
-          <p:cNvPr id="24" name="TextBox 23">
-            <a:extLst>
-              <a:ext uri="{FF2B5EF4-FFF2-40B4-BE49-F238E27FC236}">
-                <a16:creationId xmlns:a16="http://schemas.microsoft.com/office/drawing/2014/main" id="{CF747CC7-DB2C-4F91-926E-B4B198BF6C98}"/>
-              </a:ext>
-            </a:extLst>
-          </p:cNvPr>
-          <p:cNvSpPr txBox="1"/>
-          <p:nvPr/>
-        </p:nvSpPr>
-        <p:spPr>
-          <a:xfrm>
-            <a:off x="1433708" y="5229807"/>
-            <a:ext cx="789140" cy="369332"/>
-          </a:xfrm>
-          <a:prstGeom prst="rect">
-            <a:avLst/>
-          </a:prstGeom>
-          <a:noFill/>
-        </p:spPr>
-        <p:txBody>
-          <a:bodyPr wrap="square" rtlCol="1">
-            <a:spAutoFit/>
-          </a:bodyPr>
-          <a:lstStyle/>
-          <a:p>
-            <a:r>
-              <a:rPr lang="en-US" dirty="0"/>
-              <a:t>10</a:t>
-            </a:r>
-            <a:endParaRPr lang="he-IL" dirty="0"/>
-          </a:p>
-        </p:txBody>
-      </p:sp>
-      <p:sp>
-        <p:nvSpPr>
-          <p:cNvPr id="25" name="TextBox 24">
-            <a:extLst>
-              <a:ext uri="{FF2B5EF4-FFF2-40B4-BE49-F238E27FC236}">
-                <a16:creationId xmlns:a16="http://schemas.microsoft.com/office/drawing/2014/main" id="{D7A4B1A2-4364-4350-84A9-7F3DA84758A7}"/>
-              </a:ext>
-            </a:extLst>
-          </p:cNvPr>
-          <p:cNvSpPr txBox="1"/>
-          <p:nvPr/>
-        </p:nvSpPr>
-        <p:spPr>
-          <a:xfrm>
-            <a:off x="1426730" y="2687115"/>
-            <a:ext cx="789140" cy="369332"/>
-          </a:xfrm>
-          <a:prstGeom prst="rect">
-            <a:avLst/>
-          </a:prstGeom>
-          <a:noFill/>
-        </p:spPr>
-        <p:txBody>
-          <a:bodyPr wrap="square" rtlCol="1">
-            <a:spAutoFit/>
-          </a:bodyPr>
-          <a:lstStyle/>
-          <a:p>
-            <a:r>
-              <a:rPr lang="en-US" dirty="0"/>
-              <a:t>300</a:t>
-            </a:r>
-            <a:endParaRPr lang="he-IL" dirty="0"/>
-          </a:p>
-        </p:txBody>
-      </p:sp>
-      <p:sp>
-        <p:nvSpPr>
-          <p:cNvPr id="26" name="TextBox 25">
-            <a:extLst>
-              <a:ext uri="{FF2B5EF4-FFF2-40B4-BE49-F238E27FC236}">
-                <a16:creationId xmlns:a16="http://schemas.microsoft.com/office/drawing/2014/main" id="{B9318630-A3B1-43F0-9746-1FA9864A7B4E}"/>
-              </a:ext>
-            </a:extLst>
-          </p:cNvPr>
-          <p:cNvSpPr txBox="1"/>
-          <p:nvPr/>
-        </p:nvSpPr>
-        <p:spPr>
-          <a:xfrm>
-            <a:off x="1433708" y="3476081"/>
-            <a:ext cx="789140" cy="369332"/>
-          </a:xfrm>
-          <a:prstGeom prst="rect">
-            <a:avLst/>
-          </a:prstGeom>
-          <a:noFill/>
-        </p:spPr>
-        <p:txBody>
-          <a:bodyPr wrap="square" rtlCol="1">
-            <a:spAutoFit/>
-          </a:bodyPr>
-          <a:lstStyle/>
-          <a:p>
-            <a:r>
-              <a:rPr lang="en-US" dirty="0"/>
-              <a:t>200</a:t>
-            </a:r>
-            <a:endParaRPr lang="he-IL" dirty="0"/>
-          </a:p>
-        </p:txBody>
-      </p:sp>
-      <p:sp>
-        <p:nvSpPr>
-          <p:cNvPr id="27" name="TextBox 26">
-            <a:extLst>
-              <a:ext uri="{FF2B5EF4-FFF2-40B4-BE49-F238E27FC236}">
-                <a16:creationId xmlns:a16="http://schemas.microsoft.com/office/drawing/2014/main" id="{D7E49B80-8F04-41AD-919B-4ED477C97C35}"/>
-              </a:ext>
-            </a:extLst>
-          </p:cNvPr>
-          <p:cNvSpPr txBox="1"/>
-          <p:nvPr/>
-        </p:nvSpPr>
-        <p:spPr>
-          <a:xfrm>
-            <a:off x="1991651" y="5880158"/>
-            <a:ext cx="1465534" cy="369332"/>
-          </a:xfrm>
-          <a:prstGeom prst="rect">
-            <a:avLst/>
-          </a:prstGeom>
-          <a:noFill/>
-        </p:spPr>
-        <p:txBody>
-          <a:bodyPr wrap="square" rtlCol="1">
-            <a:spAutoFit/>
-          </a:bodyPr>
-          <a:lstStyle/>
-          <a:p>
-            <a:r>
-              <a:rPr lang="en-US" dirty="0"/>
-              <a:t>Securing </a:t>
-            </a:r>
-            <a:endParaRPr lang="he-IL" dirty="0"/>
-          </a:p>
-        </p:txBody>
-      </p:sp>
-      <p:sp>
-        <p:nvSpPr>
-          <p:cNvPr id="28" name="TextBox 27">
-            <a:extLst>
-              <a:ext uri="{FF2B5EF4-FFF2-40B4-BE49-F238E27FC236}">
-                <a16:creationId xmlns:a16="http://schemas.microsoft.com/office/drawing/2014/main" id="{45943BDC-E878-454D-9761-B1E1CEEF0572}"/>
-              </a:ext>
-            </a:extLst>
-          </p:cNvPr>
-          <p:cNvSpPr txBox="1"/>
-          <p:nvPr/>
-        </p:nvSpPr>
-        <p:spPr>
-          <a:xfrm>
-            <a:off x="3319397" y="5880158"/>
-            <a:ext cx="1327755" cy="369332"/>
-          </a:xfrm>
-          <a:prstGeom prst="rect">
-            <a:avLst/>
-          </a:prstGeom>
-          <a:noFill/>
-        </p:spPr>
-        <p:txBody>
-          <a:bodyPr wrap="square" rtlCol="1">
-            <a:spAutoFit/>
-          </a:bodyPr>
-          <a:lstStyle/>
-          <a:p>
-            <a:r>
-              <a:rPr lang="en-US" dirty="0"/>
-              <a:t>Cleaning </a:t>
-            </a:r>
-            <a:endParaRPr lang="he-IL" dirty="0"/>
-          </a:p>
-        </p:txBody>
-      </p:sp>
-      <p:sp>
-        <p:nvSpPr>
-          <p:cNvPr id="29" name="TextBox 28">
-            <a:extLst>
-              <a:ext uri="{FF2B5EF4-FFF2-40B4-BE49-F238E27FC236}">
-                <a16:creationId xmlns:a16="http://schemas.microsoft.com/office/drawing/2014/main" id="{E8665DA1-5E55-484B-9700-A77837CD6ADD}"/>
-              </a:ext>
-            </a:extLst>
-          </p:cNvPr>
-          <p:cNvSpPr txBox="1"/>
-          <p:nvPr/>
-        </p:nvSpPr>
-        <p:spPr>
-          <a:xfrm>
-            <a:off x="3983274" y="5880159"/>
-            <a:ext cx="1753640" cy="369332"/>
-          </a:xfrm>
-          <a:prstGeom prst="rect">
-            <a:avLst/>
-          </a:prstGeom>
-          <a:noFill/>
-        </p:spPr>
-        <p:txBody>
-          <a:bodyPr wrap="square" rtlCol="1">
-            <a:spAutoFit/>
-          </a:bodyPr>
-          <a:lstStyle/>
-          <a:p>
-            <a:r>
-              <a:rPr lang="en-US" dirty="0"/>
-              <a:t>Dean </a:t>
-            </a:r>
-            <a:endParaRPr lang="he-IL" dirty="0"/>
-          </a:p>
-        </p:txBody>
-      </p:sp>
-      <p:sp>
-        <p:nvSpPr>
-          <p:cNvPr id="30" name="TextBox 29">
-            <a:extLst>
-              <a:ext uri="{FF2B5EF4-FFF2-40B4-BE49-F238E27FC236}">
-                <a16:creationId xmlns:a16="http://schemas.microsoft.com/office/drawing/2014/main" id="{9F3E035B-C150-4F4D-BB71-2EDF9B28F410}"/>
-              </a:ext>
-            </a:extLst>
-          </p:cNvPr>
-          <p:cNvSpPr txBox="1"/>
-          <p:nvPr/>
-        </p:nvSpPr>
-        <p:spPr>
-          <a:xfrm>
-            <a:off x="5916464" y="5880158"/>
-            <a:ext cx="1628386" cy="369332"/>
-          </a:xfrm>
-          <a:prstGeom prst="rect">
-            <a:avLst/>
-          </a:prstGeom>
-          <a:noFill/>
-        </p:spPr>
-        <p:txBody>
-          <a:bodyPr wrap="square" rtlCol="1">
-            <a:spAutoFit/>
-          </a:bodyPr>
-          <a:lstStyle/>
-          <a:p>
-            <a:r>
-              <a:rPr lang="en-US" dirty="0"/>
-              <a:t>Maintenance </a:t>
-            </a:r>
-            <a:endParaRPr lang="he-IL" dirty="0"/>
-          </a:p>
-        </p:txBody>
-      </p:sp>
-      <p:sp>
-        <p:nvSpPr>
-          <p:cNvPr id="31" name="TextBox 30">
-            <a:extLst>
-              <a:ext uri="{FF2B5EF4-FFF2-40B4-BE49-F238E27FC236}">
-                <a16:creationId xmlns:a16="http://schemas.microsoft.com/office/drawing/2014/main" id="{2AA37F1E-12FC-45F5-A9C3-57AD911BAE43}"/>
-              </a:ext>
-            </a:extLst>
-          </p:cNvPr>
-          <p:cNvSpPr txBox="1"/>
-          <p:nvPr/>
-        </p:nvSpPr>
-        <p:spPr>
-          <a:xfrm>
-            <a:off x="7536505" y="5884270"/>
-            <a:ext cx="2275555" cy="369332"/>
-          </a:xfrm>
-          <a:prstGeom prst="rect">
-            <a:avLst/>
-          </a:prstGeom>
-          <a:noFill/>
-        </p:spPr>
-        <p:txBody>
-          <a:bodyPr wrap="square" rtlCol="1">
-            <a:spAutoFit/>
-          </a:bodyPr>
-          <a:lstStyle/>
-          <a:p>
-            <a:r>
-              <a:rPr lang="en-US" dirty="0"/>
-              <a:t>Students Association</a:t>
-            </a:r>
-            <a:endParaRPr lang="he-IL" dirty="0"/>
-          </a:p>
-        </p:txBody>
-      </p:sp>
-      <p:sp>
-        <p:nvSpPr>
-          <p:cNvPr id="32" name="מלבן 31">
-            <a:extLst>
-              <a:ext uri="{FF2B5EF4-FFF2-40B4-BE49-F238E27FC236}">
-                <a16:creationId xmlns:a16="http://schemas.microsoft.com/office/drawing/2014/main" id="{B9DF018A-8D5C-4BA4-A2E9-6BBD00880238}"/>
-              </a:ext>
-            </a:extLst>
-          </p:cNvPr>
-          <p:cNvSpPr/>
-          <p:nvPr/>
-        </p:nvSpPr>
-        <p:spPr>
-          <a:xfrm>
-            <a:off x="2668044" y="5336089"/>
-            <a:ext cx="438403" cy="450937"/>
-          </a:xfrm>
-          <a:prstGeom prst="rect">
-            <a:avLst/>
-          </a:prstGeom>
-          <a:solidFill>
-            <a:srgbClr val="92D050"/>
-          </a:solidFill>
-          <a:ln w="28575">
-            <a:solidFill>
-              <a:schemeClr val="accent6">
-                <a:lumMod val="75000"/>
-              </a:schemeClr>
-            </a:solidFill>
-          </a:ln>
-        </p:spPr>
-        <p:style>
-          <a:lnRef idx="2">
-            <a:schemeClr val="accent1">
-              <a:shade val="50000"/>
-            </a:schemeClr>
-          </a:lnRef>
-          <a:fillRef idx="1">
-            <a:schemeClr val="accent1"/>
-          </a:fillRef>
-          <a:effectRef idx="0">
-            <a:schemeClr val="accent1"/>
-          </a:effectRef>
-          <a:fontRef idx="minor">
-            <a:schemeClr val="lt1"/>
-          </a:fontRef>
-        </p:style>
-        <p:txBody>
-          <a:bodyPr rtlCol="1" anchor="ctr"/>
-          <a:lstStyle/>
-          <a:p>
-            <a:pPr algn="ctr"/>
-            <a:endParaRPr lang="he-IL"/>
-          </a:p>
-        </p:txBody>
-      </p:sp>
-      <p:sp>
-        <p:nvSpPr>
-          <p:cNvPr id="33" name="מלבן 32">
-            <a:extLst>
-              <a:ext uri="{FF2B5EF4-FFF2-40B4-BE49-F238E27FC236}">
-                <a16:creationId xmlns:a16="http://schemas.microsoft.com/office/drawing/2014/main" id="{1D574789-0304-4757-9B56-64FAB6821415}"/>
-              </a:ext>
-            </a:extLst>
-          </p:cNvPr>
-          <p:cNvSpPr/>
-          <p:nvPr/>
-        </p:nvSpPr>
-        <p:spPr>
-          <a:xfrm>
-            <a:off x="3876806" y="3895715"/>
-            <a:ext cx="438403" cy="1891311"/>
-          </a:xfrm>
-          <a:prstGeom prst="rect">
-            <a:avLst/>
-          </a:prstGeom>
-          <a:solidFill>
-            <a:srgbClr val="92D050"/>
-          </a:solidFill>
-          <a:ln w="28575">
-            <a:solidFill>
-              <a:schemeClr val="accent6">
-                <a:lumMod val="75000"/>
-              </a:schemeClr>
-            </a:solidFill>
-          </a:ln>
-        </p:spPr>
-        <p:style>
-          <a:lnRef idx="2">
-            <a:schemeClr val="accent1">
-              <a:shade val="50000"/>
-            </a:schemeClr>
-          </a:lnRef>
-          <a:fillRef idx="1">
-            <a:schemeClr val="accent1"/>
-          </a:fillRef>
-          <a:effectRef idx="0">
-            <a:schemeClr val="accent1"/>
-          </a:effectRef>
-          <a:fontRef idx="minor">
-            <a:schemeClr val="lt1"/>
-          </a:fontRef>
-        </p:style>
-        <p:txBody>
-          <a:bodyPr rtlCol="1" anchor="ctr"/>
-          <a:lstStyle/>
-          <a:p>
-            <a:pPr algn="ctr"/>
-            <a:endParaRPr lang="he-IL"/>
-          </a:p>
-        </p:txBody>
-      </p:sp>
-      <p:sp>
-        <p:nvSpPr>
-          <p:cNvPr id="34" name="מלבן 33">
-            <a:extLst>
-              <a:ext uri="{FF2B5EF4-FFF2-40B4-BE49-F238E27FC236}">
-                <a16:creationId xmlns:a16="http://schemas.microsoft.com/office/drawing/2014/main" id="{A58C9825-C3E4-4B8E-A829-2CEBF907EF57}"/>
-              </a:ext>
-            </a:extLst>
-          </p:cNvPr>
-          <p:cNvSpPr/>
-          <p:nvPr/>
-        </p:nvSpPr>
-        <p:spPr>
-          <a:xfrm>
-            <a:off x="5160716" y="3767238"/>
-            <a:ext cx="438403" cy="2019788"/>
-          </a:xfrm>
-          <a:prstGeom prst="rect">
-            <a:avLst/>
-          </a:prstGeom>
-          <a:solidFill>
-            <a:srgbClr val="92D050"/>
-          </a:solidFill>
-          <a:ln w="28575">
-            <a:solidFill>
-              <a:schemeClr val="accent6">
-                <a:lumMod val="75000"/>
-              </a:schemeClr>
-            </a:solidFill>
-          </a:ln>
-        </p:spPr>
-        <p:style>
-          <a:lnRef idx="2">
-            <a:schemeClr val="accent1">
-              <a:shade val="50000"/>
-            </a:schemeClr>
-          </a:lnRef>
-          <a:fillRef idx="1">
-            <a:schemeClr val="accent1"/>
-          </a:fillRef>
-          <a:effectRef idx="0">
-            <a:schemeClr val="accent1"/>
-          </a:effectRef>
-          <a:fontRef idx="minor">
-            <a:schemeClr val="lt1"/>
-          </a:fontRef>
-        </p:style>
-        <p:txBody>
-          <a:bodyPr rtlCol="1" anchor="ctr"/>
-          <a:lstStyle/>
-          <a:p>
-            <a:pPr algn="ctr"/>
-            <a:endParaRPr lang="he-IL"/>
-          </a:p>
-        </p:txBody>
-      </p:sp>
-      <p:sp>
-        <p:nvSpPr>
-          <p:cNvPr id="35" name="מלבן 34">
-            <a:extLst>
-              <a:ext uri="{FF2B5EF4-FFF2-40B4-BE49-F238E27FC236}">
-                <a16:creationId xmlns:a16="http://schemas.microsoft.com/office/drawing/2014/main" id="{056A8E07-0F56-4147-9E3C-337329C9A43E}"/>
-              </a:ext>
-            </a:extLst>
-          </p:cNvPr>
-          <p:cNvSpPr/>
-          <p:nvPr/>
-        </p:nvSpPr>
-        <p:spPr>
-          <a:xfrm>
-            <a:off x="6642981" y="3056447"/>
-            <a:ext cx="438403" cy="2730579"/>
-          </a:xfrm>
-          <a:prstGeom prst="rect">
-            <a:avLst/>
-          </a:prstGeom>
-          <a:solidFill>
-            <a:srgbClr val="92D050"/>
-          </a:solidFill>
-          <a:ln w="28575">
-            <a:solidFill>
-              <a:schemeClr val="accent6">
-                <a:lumMod val="75000"/>
-              </a:schemeClr>
-            </a:solidFill>
-          </a:ln>
-        </p:spPr>
-        <p:style>
-          <a:lnRef idx="2">
-            <a:schemeClr val="accent1">
-              <a:shade val="50000"/>
-            </a:schemeClr>
-          </a:lnRef>
-          <a:fillRef idx="1">
-            <a:schemeClr val="accent1"/>
-          </a:fillRef>
-          <a:effectRef idx="0">
-            <a:schemeClr val="accent1"/>
-          </a:effectRef>
-          <a:fontRef idx="minor">
-            <a:schemeClr val="lt1"/>
-          </a:fontRef>
-        </p:style>
-        <p:txBody>
-          <a:bodyPr rtlCol="1" anchor="ctr"/>
-          <a:lstStyle/>
-          <a:p>
-            <a:pPr algn="ctr"/>
-            <a:endParaRPr lang="he-IL"/>
-          </a:p>
-        </p:txBody>
-      </p:sp>
-      <p:sp>
-        <p:nvSpPr>
-          <p:cNvPr id="36" name="מלבן 35">
-            <a:extLst>
-              <a:ext uri="{FF2B5EF4-FFF2-40B4-BE49-F238E27FC236}">
-                <a16:creationId xmlns:a16="http://schemas.microsoft.com/office/drawing/2014/main" id="{4031DEC8-A650-4553-BF5B-A926999EECFA}"/>
-              </a:ext>
-            </a:extLst>
-          </p:cNvPr>
-          <p:cNvSpPr/>
-          <p:nvPr/>
-        </p:nvSpPr>
-        <p:spPr>
-          <a:xfrm>
-            <a:off x="8455080" y="5143079"/>
-            <a:ext cx="438403" cy="643947"/>
-          </a:xfrm>
-          <a:prstGeom prst="rect">
-            <a:avLst/>
-          </a:prstGeom>
-          <a:solidFill>
-            <a:srgbClr val="92D050"/>
-          </a:solidFill>
-          <a:ln w="28575">
-            <a:solidFill>
-              <a:schemeClr val="accent6">
-                <a:lumMod val="75000"/>
-              </a:schemeClr>
-            </a:solidFill>
-          </a:ln>
-        </p:spPr>
-        <p:style>
-          <a:lnRef idx="2">
-            <a:schemeClr val="accent1">
-              <a:shade val="50000"/>
-            </a:schemeClr>
-          </a:lnRef>
-          <a:fillRef idx="1">
-            <a:schemeClr val="accent1"/>
-          </a:fillRef>
-          <a:effectRef idx="0">
-            <a:schemeClr val="accent1"/>
-          </a:effectRef>
-          <a:fontRef idx="minor">
-            <a:schemeClr val="lt1"/>
-          </a:fontRef>
-        </p:style>
-        <p:txBody>
-          <a:bodyPr rtlCol="1" anchor="ctr"/>
-          <a:lstStyle/>
-          <a:p>
-            <a:pPr algn="ctr"/>
-            <a:endParaRPr lang="he-IL"/>
-          </a:p>
-        </p:txBody>
-      </p:sp>
-      <p:sp>
-        <p:nvSpPr>
-          <p:cNvPr id="38" name="TextBox 37">
-            <a:extLst>
-              <a:ext uri="{FF2B5EF4-FFF2-40B4-BE49-F238E27FC236}">
-                <a16:creationId xmlns:a16="http://schemas.microsoft.com/office/drawing/2014/main" id="{871A2E64-3208-4676-9645-03870A0CCA22}"/>
-              </a:ext>
-            </a:extLst>
-          </p:cNvPr>
-          <p:cNvSpPr txBox="1"/>
-          <p:nvPr/>
-        </p:nvSpPr>
-        <p:spPr>
-          <a:xfrm>
-            <a:off x="6574087" y="2601572"/>
-            <a:ext cx="576189" cy="369332"/>
-          </a:xfrm>
-          <a:prstGeom prst="rect">
-            <a:avLst/>
-          </a:prstGeom>
-          <a:noFill/>
-        </p:spPr>
-        <p:txBody>
-          <a:bodyPr wrap="square" rtlCol="1">
-            <a:spAutoFit/>
-          </a:bodyPr>
-          <a:lstStyle/>
-          <a:p>
-            <a:r>
-              <a:rPr lang="he-IL" dirty="0"/>
-              <a:t>275</a:t>
-            </a:r>
-          </a:p>
-        </p:txBody>
-      </p:sp>
-      <p:sp>
-        <p:nvSpPr>
-          <p:cNvPr id="41" name="TextBox 40">
-            <a:extLst>
-              <a:ext uri="{FF2B5EF4-FFF2-40B4-BE49-F238E27FC236}">
-                <a16:creationId xmlns:a16="http://schemas.microsoft.com/office/drawing/2014/main" id="{718951D3-AE54-43AF-B183-7296B8A42310}"/>
-              </a:ext>
-            </a:extLst>
-          </p:cNvPr>
-          <p:cNvSpPr txBox="1"/>
-          <p:nvPr/>
-        </p:nvSpPr>
-        <p:spPr>
-          <a:xfrm>
-            <a:off x="8413313" y="4773748"/>
-            <a:ext cx="480170" cy="369332"/>
-          </a:xfrm>
-          <a:prstGeom prst="rect">
-            <a:avLst/>
-          </a:prstGeom>
-          <a:noFill/>
-        </p:spPr>
-        <p:txBody>
-          <a:bodyPr wrap="square" rtlCol="1">
-            <a:spAutoFit/>
-          </a:bodyPr>
-          <a:lstStyle/>
-          <a:p>
-            <a:r>
-              <a:rPr lang="he-IL" dirty="0"/>
-              <a:t>40</a:t>
-            </a:r>
-          </a:p>
-        </p:txBody>
-      </p:sp>
-      <p:sp>
-        <p:nvSpPr>
-          <p:cNvPr id="42" name="TextBox 41">
-            <a:extLst>
-              <a:ext uri="{FF2B5EF4-FFF2-40B4-BE49-F238E27FC236}">
-                <a16:creationId xmlns:a16="http://schemas.microsoft.com/office/drawing/2014/main" id="{A8A5ADE7-8AE1-419B-846E-C4E040CCC93E}"/>
-              </a:ext>
-            </a:extLst>
-          </p:cNvPr>
-          <p:cNvSpPr txBox="1"/>
-          <p:nvPr/>
-        </p:nvSpPr>
-        <p:spPr>
-          <a:xfrm>
-            <a:off x="4837148" y="3358836"/>
-            <a:ext cx="839234" cy="369332"/>
-          </a:xfrm>
-          <a:prstGeom prst="rect">
-            <a:avLst/>
-          </a:prstGeom>
-          <a:noFill/>
-        </p:spPr>
-        <p:txBody>
-          <a:bodyPr wrap="square" rtlCol="1">
-            <a:spAutoFit/>
-          </a:bodyPr>
-          <a:lstStyle/>
-          <a:p>
-            <a:r>
-              <a:rPr lang="he-IL" dirty="0"/>
-              <a:t>200</a:t>
-            </a:r>
-          </a:p>
-        </p:txBody>
-      </p:sp>
-      <p:sp>
-        <p:nvSpPr>
-          <p:cNvPr id="43" name="TextBox 42">
-            <a:extLst>
-              <a:ext uri="{FF2B5EF4-FFF2-40B4-BE49-F238E27FC236}">
-                <a16:creationId xmlns:a16="http://schemas.microsoft.com/office/drawing/2014/main" id="{E456ACF4-64A6-4ACB-BB4F-C621149B506E}"/>
-              </a:ext>
-            </a:extLst>
-          </p:cNvPr>
-          <p:cNvSpPr txBox="1"/>
-          <p:nvPr/>
-        </p:nvSpPr>
-        <p:spPr>
-          <a:xfrm>
-            <a:off x="3554272" y="3539381"/>
-            <a:ext cx="789127" cy="369332"/>
-          </a:xfrm>
-          <a:prstGeom prst="rect">
-            <a:avLst/>
-          </a:prstGeom>
-          <a:noFill/>
-        </p:spPr>
-        <p:txBody>
-          <a:bodyPr wrap="square" rtlCol="1">
-            <a:spAutoFit/>
-          </a:bodyPr>
-          <a:lstStyle/>
-          <a:p>
-            <a:r>
-              <a:rPr lang="he-IL" dirty="0"/>
-              <a:t>160</a:t>
-            </a:r>
-          </a:p>
-        </p:txBody>
-      </p:sp>
-      <p:sp>
-        <p:nvSpPr>
-          <p:cNvPr id="44" name="TextBox 43">
-            <a:extLst>
-              <a:ext uri="{FF2B5EF4-FFF2-40B4-BE49-F238E27FC236}">
-                <a16:creationId xmlns:a16="http://schemas.microsoft.com/office/drawing/2014/main" id="{BEAAED97-1023-4ADF-A587-0B4360EBDE79}"/>
-              </a:ext>
-            </a:extLst>
-          </p:cNvPr>
-          <p:cNvSpPr txBox="1"/>
-          <p:nvPr/>
-        </p:nvSpPr>
-        <p:spPr>
-          <a:xfrm>
-            <a:off x="2236805" y="4937904"/>
-            <a:ext cx="876822" cy="369332"/>
-          </a:xfrm>
-          <a:prstGeom prst="rect">
-            <a:avLst/>
-          </a:prstGeom>
-          <a:noFill/>
-        </p:spPr>
-        <p:txBody>
-          <a:bodyPr wrap="square" rtlCol="1">
-            <a:spAutoFit/>
-          </a:bodyPr>
-          <a:lstStyle/>
-          <a:p>
-            <a:r>
-              <a:rPr lang="he-IL" dirty="0"/>
-              <a:t>20</a:t>
-            </a:r>
-          </a:p>
-        </p:txBody>
-      </p:sp>
-      <p:sp>
-        <p:nvSpPr>
-          <p:cNvPr id="46" name="TextBox 45">
-            <a:extLst>
-              <a:ext uri="{FF2B5EF4-FFF2-40B4-BE49-F238E27FC236}">
-                <a16:creationId xmlns:a16="http://schemas.microsoft.com/office/drawing/2014/main" id="{8AE7AF00-1948-4797-BA21-82B4998F5306}"/>
-              </a:ext>
-            </a:extLst>
-          </p:cNvPr>
-          <p:cNvSpPr txBox="1"/>
-          <p:nvPr/>
-        </p:nvSpPr>
-        <p:spPr>
-          <a:xfrm>
-            <a:off x="9883060" y="5573877"/>
-            <a:ext cx="1691011" cy="369332"/>
-          </a:xfrm>
-          <a:prstGeom prst="rect">
-            <a:avLst/>
-          </a:prstGeom>
-          <a:noFill/>
-        </p:spPr>
-        <p:txBody>
-          <a:bodyPr wrap="square" rtlCol="1">
-            <a:spAutoFit/>
-          </a:bodyPr>
-          <a:lstStyle/>
-          <a:p>
-            <a:r>
-              <a:rPr lang="en-US" dirty="0"/>
-              <a:t>Supervisor </a:t>
-            </a:r>
-            <a:endParaRPr lang="he-IL" dirty="0"/>
-          </a:p>
-        </p:txBody>
-      </p:sp>
-      <p:pic>
-        <p:nvPicPr>
-          <p:cNvPr id="47" name="תמונה 46">
-            <a:hlinkClick r:id="rId2" action="ppaction://hlinksldjump"/>
-            <a:extLst>
-              <a:ext uri="{FF2B5EF4-FFF2-40B4-BE49-F238E27FC236}">
-                <a16:creationId xmlns:a16="http://schemas.microsoft.com/office/drawing/2014/main" id="{F58C4563-86F7-48D8-92AB-E2497D45AAC2}"/>
-              </a:ext>
-            </a:extLst>
-          </p:cNvPr>
-          <p:cNvPicPr>
-            <a:picLocks noChangeAspect="1"/>
-          </p:cNvPicPr>
-          <p:nvPr/>
-        </p:nvPicPr>
-        <p:blipFill>
-          <a:blip r:embed="rId3"/>
-          <a:stretch>
-            <a:fillRect/>
-          </a:stretch>
-        </p:blipFill>
-        <p:spPr>
-          <a:xfrm>
-            <a:off x="79893" y="199347"/>
-            <a:ext cx="499915" cy="499915"/>
-          </a:xfrm>
-          <a:prstGeom prst="rect">
-            <a:avLst/>
-          </a:prstGeom>
-        </p:spPr>
-      </p:pic>
-      <p:sp>
-        <p:nvSpPr>
-          <p:cNvPr id="48" name="אליפסה 47">
-            <a:hlinkClick r:id="rId4" action="ppaction://hlinksldjump"/>
-            <a:extLst>
-              <a:ext uri="{FF2B5EF4-FFF2-40B4-BE49-F238E27FC236}">
-                <a16:creationId xmlns:a16="http://schemas.microsoft.com/office/drawing/2014/main" id="{E97464E1-1896-422E-A7E0-BB4C5C24790E}"/>
-              </a:ext>
-            </a:extLst>
-          </p:cNvPr>
-          <p:cNvSpPr/>
-          <p:nvPr/>
-        </p:nvSpPr>
-        <p:spPr>
-          <a:xfrm>
-            <a:off x="11117396" y="5916738"/>
-            <a:ext cx="934594" cy="868640"/>
-          </a:xfrm>
-          <a:prstGeom prst="ellipse">
-            <a:avLst/>
-          </a:prstGeom>
-          <a:solidFill>
-            <a:srgbClr val="92D050"/>
-          </a:solidFill>
-          <a:ln w="19050">
-            <a:solidFill>
-              <a:schemeClr val="accent6">
-                <a:lumMod val="60000"/>
-                <a:lumOff val="40000"/>
-              </a:schemeClr>
-            </a:solidFill>
-          </a:ln>
-        </p:spPr>
-        <p:style>
-          <a:lnRef idx="2">
-            <a:schemeClr val="accent1">
-              <a:shade val="50000"/>
-            </a:schemeClr>
-          </a:lnRef>
-          <a:fillRef idx="1">
-            <a:schemeClr val="accent1"/>
-          </a:fillRef>
-          <a:effectRef idx="0">
-            <a:schemeClr val="accent1"/>
-          </a:effectRef>
-          <a:fontRef idx="minor">
-            <a:schemeClr val="lt1"/>
-          </a:fontRef>
-        </p:style>
-        <p:txBody>
-          <a:bodyPr rtlCol="1" anchor="ctr"/>
-          <a:lstStyle/>
-          <a:p>
-            <a:pPr algn="ctr"/>
-            <a:r>
-              <a:rPr lang="en-US" sz="2000" dirty="0">
-                <a:solidFill>
-                  <a:schemeClr val="bg1"/>
-                </a:solidFill>
-                <a:latin typeface="Arial Narrow" panose="020B0606020202030204" pitchFamily="34" charset="0"/>
-              </a:rPr>
-              <a:t>Back</a:t>
-            </a:r>
-            <a:endParaRPr lang="he-IL" sz="2000" dirty="0">
-              <a:solidFill>
-                <a:schemeClr val="bg1"/>
-              </a:solidFill>
-              <a:latin typeface="Arial Narrow" panose="020B0606020202030204" pitchFamily="34" charset="0"/>
-            </a:endParaRPr>
-          </a:p>
-        </p:txBody>
-      </p:sp>
-    </p:spTree>
-    <p:extLst>
-      <p:ext uri="{BB962C8B-B14F-4D97-AF65-F5344CB8AC3E}">
-        <p14:creationId xmlns:p14="http://schemas.microsoft.com/office/powerpoint/2010/main" val="4044948089"/>
-      </p:ext>
-    </p:extLst>
-  </p:cSld>
-  <p:clrMapOvr>
-    <a:masterClrMapping/>
-  </p:clrMapOvr>
-</p:sld>
-</file>
-
-<file path=ppt/slides/slide22.xml><?xml version="1.0" encoding="utf-8"?>
-<p:sld xmlns:a="http://schemas.openxmlformats.org/drawingml/2006/main" xmlns:r="http://schemas.openxmlformats.org/officeDocument/2006/relationships" xmlns:p="http://schemas.openxmlformats.org/presentationml/2006/main">
-  <p:cSld>
-    <p:spTree>
-      <p:nvGrpSpPr>
-        <p:cNvPr id="1" name=""/>
-        <p:cNvGrpSpPr/>
-        <p:nvPr/>
-      </p:nvGrpSpPr>
-      <p:grpSpPr>
-        <a:xfrm>
-          <a:off x="0" y="0"/>
-          <a:ext cx="0" cy="0"/>
-          <a:chOff x="0" y="0"/>
-          <a:chExt cx="0" cy="0"/>
-        </a:xfrm>
-      </p:grpSpPr>
-      <p:sp>
-        <p:nvSpPr>
-          <p:cNvPr id="2" name="כותרת 1">
-            <a:extLst>
-              <a:ext uri="{FF2B5EF4-FFF2-40B4-BE49-F238E27FC236}">
                 <a16:creationId xmlns:a16="http://schemas.microsoft.com/office/drawing/2014/main" id="{D1D6F690-6915-4F81-AFC2-647F64877C6D}"/>
               </a:ext>
             </a:extLst>
@@ -17986,7 +17346,7 @@
 </p:sld>
 </file>
 
-<file path=ppt/slides/slide23.xml><?xml version="1.0" encoding="utf-8"?>
+<file path=ppt/slides/slide22.xml><?xml version="1.0" encoding="utf-8"?>
 <p:sld xmlns:a="http://schemas.openxmlformats.org/drawingml/2006/main" xmlns:r="http://schemas.openxmlformats.org/officeDocument/2006/relationships" xmlns:p="http://schemas.openxmlformats.org/presentationml/2006/main">
   <p:cSld>
     <p:spTree>
@@ -19165,7 +18525,7 @@
 </p:sld>
 </file>
 
-<file path=ppt/slides/slide24.xml><?xml version="1.0" encoding="utf-8"?>
+<file path=ppt/slides/slide23.xml><?xml version="1.0" encoding="utf-8"?>
 <p:sld xmlns:a="http://schemas.openxmlformats.org/drawingml/2006/main" xmlns:r="http://schemas.openxmlformats.org/officeDocument/2006/relationships" xmlns:p="http://schemas.openxmlformats.org/presentationml/2006/main">
   <p:cSld>
     <p:spTree>
@@ -19729,7 +19089,7 @@
 </p:sld>
 </file>
 
-<file path=ppt/slides/slide25.xml><?xml version="1.0" encoding="utf-8"?>
+<file path=ppt/slides/slide24.xml><?xml version="1.0" encoding="utf-8"?>
 <p:sld xmlns:a="http://schemas.openxmlformats.org/drawingml/2006/main" xmlns:r="http://schemas.openxmlformats.org/officeDocument/2006/relationships" xmlns:p="http://schemas.openxmlformats.org/presentationml/2006/main">
   <p:cSld>
     <p:bg>
@@ -19929,7 +19289,7 @@
 </p:sld>
 </file>
 
-<file path=ppt/slides/slide26.xml><?xml version="1.0" encoding="utf-8"?>
+<file path=ppt/slides/slide25.xml><?xml version="1.0" encoding="utf-8"?>
 <p:sld xmlns:a="http://schemas.openxmlformats.org/drawingml/2006/main" xmlns:r="http://schemas.openxmlformats.org/officeDocument/2006/relationships" xmlns:p="http://schemas.openxmlformats.org/presentationml/2006/main">
   <p:cSld>
     <p:bg>
@@ -20115,7 +19475,7 @@
 </p:sld>
 </file>
 
-<file path=ppt/slides/slide27.xml><?xml version="1.0" encoding="utf-8"?>
+<file path=ppt/slides/slide26.xml><?xml version="1.0" encoding="utf-8"?>
 <p:sld xmlns:a="http://schemas.openxmlformats.org/drawingml/2006/main" xmlns:r="http://schemas.openxmlformats.org/officeDocument/2006/relationships" xmlns:p="http://schemas.openxmlformats.org/presentationml/2006/main">
   <p:cSld>
     <p:bg>

</xml_diff>